<commit_message>
LOBO layout and extend AOPID color plot palette
</commit_message>
<xml_diff>
--- a/Presentations/AOPwiki_analysis.pptx
+++ b/Presentations/AOPwiki_analysis.pptx
@@ -5,7 +5,7 @@
     <p:sldMasterId id="2147483684" r:id="rId1"/>
   </p:sldMasterIdLst>
   <p:notesMasterIdLst>
-    <p:notesMasterId r:id="rId17"/>
+    <p:notesMasterId r:id="rId16"/>
   </p:notesMasterIdLst>
   <p:sldIdLst>
     <p:sldId id="256" r:id="rId2"/>
@@ -22,7 +22,6 @@
     <p:sldId id="270" r:id="rId13"/>
     <p:sldId id="271" r:id="rId14"/>
     <p:sldId id="272" r:id="rId15"/>
-    <p:sldId id="273" r:id="rId16"/>
   </p:sldIdLst>
   <p:sldSz cx="12192000" cy="6858000"/>
   <p:notesSz cx="6858000" cy="9144000"/>
@@ -140,7 +139,6 @@
             <p14:sldId id="270"/>
             <p14:sldId id="271"/>
             <p14:sldId id="272"/>
-            <p14:sldId id="273"/>
           </p14:sldIdLst>
         </p14:section>
       </p14:sectionLst>
@@ -246,7 +244,7 @@
           <a:p>
             <a:fld id="{000F2778-583D-47DD-9F96-F6161A447264}" type="datetimeFigureOut">
               <a:rPr lang="en-US" smtClean="0"/>
-              <a:t>6/8/2017</a:t>
+              <a:t>6/19/2017</a:t>
             </a:fld>
             <a:endParaRPr lang="en-US"/>
           </a:p>
@@ -559,6 +557,14 @@
           <a:p>
             <a:r>
               <a:rPr lang="en-US" dirty="0"/>
+              <a:t>To</a:t>
+            </a:r>
+            <a:r>
+              <a:rPr lang="en-US" baseline="0" dirty="0"/>
+              <a:t> do: </a:t>
+            </a:r>
+            <a:r>
+              <a:rPr lang="en-US" dirty="0"/>
               <a:t>Expand color palette,</a:t>
             </a:r>
             <a:r>
@@ -665,6 +671,14 @@
           <a:p>
             <a:r>
               <a:rPr lang="en-US" dirty="0"/>
+              <a:t>To do:</a:t>
+            </a:r>
+            <a:r>
+              <a:rPr lang="en-US" baseline="0" dirty="0"/>
+              <a:t> </a:t>
+            </a:r>
+            <a:r>
+              <a:rPr lang="en-US" dirty="0"/>
               <a:t>Network analysis to identify SODAs?</a:t>
             </a:r>
             <a:r>
@@ -757,6 +771,14 @@
           <a:p>
             <a:r>
               <a:rPr lang="en-US" dirty="0"/>
+              <a:t>To do:</a:t>
+            </a:r>
+            <a:r>
+              <a:rPr lang="en-US" baseline="0" dirty="0"/>
+              <a:t> </a:t>
+            </a:r>
+            <a:r>
+              <a:rPr lang="en-US" dirty="0"/>
               <a:t>Create layout</a:t>
             </a:r>
             <a:r>
@@ -848,7 +870,7 @@
           <a:p>
             <a:r>
               <a:rPr lang="en-US" dirty="0"/>
-              <a:t>More specific</a:t>
+              <a:t>To do: More specific</a:t>
             </a:r>
             <a:r>
               <a:rPr lang="en-US" baseline="0" dirty="0"/>
@@ -940,7 +962,7 @@
           <a:p>
             <a:r>
               <a:rPr lang="en-US" dirty="0"/>
-              <a:t>Incomplete AOP vs</a:t>
+              <a:t>To do: Incomplete AOP vs</a:t>
             </a:r>
             <a:r>
               <a:rPr lang="en-US" baseline="0" dirty="0"/>
@@ -977,90 +999,6 @@
     <p:extLst>
       <p:ext uri="{BB962C8B-B14F-4D97-AF65-F5344CB8AC3E}">
         <p14:creationId xmlns:p14="http://schemas.microsoft.com/office/powerpoint/2010/main" val="3551145391"/>
-      </p:ext>
-    </p:extLst>
-  </p:cSld>
-  <p:clrMapOvr>
-    <a:masterClrMapping/>
-  </p:clrMapOvr>
-</p:notes>
-</file>
-
-<file path=ppt/notesSlides/notesSlide6.xml><?xml version="1.0" encoding="utf-8"?>
-<p:notes xmlns:a="http://schemas.openxmlformats.org/drawingml/2006/main" xmlns:r="http://schemas.openxmlformats.org/officeDocument/2006/relationships" xmlns:p="http://schemas.openxmlformats.org/presentationml/2006/main">
-  <p:cSld>
-    <p:spTree>
-      <p:nvGrpSpPr>
-        <p:cNvPr id="1" name=""/>
-        <p:cNvGrpSpPr/>
-        <p:nvPr/>
-      </p:nvGrpSpPr>
-      <p:grpSpPr>
-        <a:xfrm>
-          <a:off x="0" y="0"/>
-          <a:ext cx="0" cy="0"/>
-          <a:chOff x="0" y="0"/>
-          <a:chExt cx="0" cy="0"/>
-        </a:xfrm>
-      </p:grpSpPr>
-      <p:sp>
-        <p:nvSpPr>
-          <p:cNvPr id="2" name="Slide Image Placeholder 1"/>
-          <p:cNvSpPr>
-            <a:spLocks noGrp="1" noRot="1" noChangeAspect="1"/>
-          </p:cNvSpPr>
-          <p:nvPr>
-            <p:ph type="sldImg"/>
-          </p:nvPr>
-        </p:nvSpPr>
-        <p:spPr/>
-      </p:sp>
-      <p:sp>
-        <p:nvSpPr>
-          <p:cNvPr id="3" name="Notes Placeholder 2"/>
-          <p:cNvSpPr>
-            <a:spLocks noGrp="1"/>
-          </p:cNvSpPr>
-          <p:nvPr>
-            <p:ph type="body" idx="1"/>
-          </p:nvPr>
-        </p:nvSpPr>
-        <p:spPr/>
-        <p:txBody>
-          <a:bodyPr/>
-          <a:lstStyle/>
-          <a:p>
-            <a:endParaRPr lang="en-US" dirty="0"/>
-          </a:p>
-        </p:txBody>
-      </p:sp>
-      <p:sp>
-        <p:nvSpPr>
-          <p:cNvPr id="4" name="Slide Number Placeholder 3"/>
-          <p:cNvSpPr>
-            <a:spLocks noGrp="1"/>
-          </p:cNvSpPr>
-          <p:nvPr>
-            <p:ph type="sldNum" sz="quarter" idx="10"/>
-          </p:nvPr>
-        </p:nvSpPr>
-        <p:spPr/>
-        <p:txBody>
-          <a:bodyPr/>
-          <a:lstStyle/>
-          <a:p>
-            <a:fld id="{8C5291EA-D524-4968-939F-FF9188A27C11}" type="slidenum">
-              <a:rPr lang="en-US" smtClean="0"/>
-              <a:t>15</a:t>
-            </a:fld>
-            <a:endParaRPr lang="en-US"/>
-          </a:p>
-        </p:txBody>
-      </p:sp>
-    </p:spTree>
-    <p:extLst>
-      <p:ext uri="{BB962C8B-B14F-4D97-AF65-F5344CB8AC3E}">
-        <p14:creationId xmlns:p14="http://schemas.microsoft.com/office/powerpoint/2010/main" val="3716588743"/>
       </p:ext>
     </p:extLst>
   </p:cSld>
@@ -1201,7 +1139,7 @@
           <a:p>
             <a:fld id="{C71581C8-DC5B-4BAA-A235-D61CE073C796}" type="datetimeFigureOut">
               <a:rPr lang="en-US" smtClean="0"/>
-              <a:t>6/8/2017</a:t>
+              <a:t>6/19/2017</a:t>
             </a:fld>
             <a:endParaRPr lang="en-US"/>
           </a:p>
@@ -1376,7 +1314,7 @@
           <a:p>
             <a:fld id="{C71581C8-DC5B-4BAA-A235-D61CE073C796}" type="datetimeFigureOut">
               <a:rPr lang="en-US" smtClean="0"/>
-              <a:t>6/8/2017</a:t>
+              <a:t>6/19/2017</a:t>
             </a:fld>
             <a:endParaRPr lang="en-US"/>
           </a:p>
@@ -1556,7 +1494,7 @@
           <a:p>
             <a:fld id="{C71581C8-DC5B-4BAA-A235-D61CE073C796}" type="datetimeFigureOut">
               <a:rPr lang="en-US" smtClean="0"/>
-              <a:t>6/8/2017</a:t>
+              <a:t>6/19/2017</a:t>
             </a:fld>
             <a:endParaRPr lang="en-US"/>
           </a:p>
@@ -1731,7 +1669,7 @@
           <a:p>
             <a:fld id="{C71581C8-DC5B-4BAA-A235-D61CE073C796}" type="datetimeFigureOut">
               <a:rPr lang="en-US" smtClean="0"/>
-              <a:t>6/8/2017</a:t>
+              <a:t>6/19/2017</a:t>
             </a:fld>
             <a:endParaRPr lang="en-US"/>
           </a:p>
@@ -1977,7 +1915,7 @@
           <a:p>
             <a:fld id="{C71581C8-DC5B-4BAA-A235-D61CE073C796}" type="datetimeFigureOut">
               <a:rPr lang="en-US" smtClean="0"/>
-              <a:t>6/8/2017</a:t>
+              <a:t>6/19/2017</a:t>
             </a:fld>
             <a:endParaRPr lang="en-US"/>
           </a:p>
@@ -2214,7 +2152,7 @@
           <a:p>
             <a:fld id="{C71581C8-DC5B-4BAA-A235-D61CE073C796}" type="datetimeFigureOut">
               <a:rPr lang="en-US" smtClean="0"/>
-              <a:t>6/8/2017</a:t>
+              <a:t>6/19/2017</a:t>
             </a:fld>
             <a:endParaRPr lang="en-US"/>
           </a:p>
@@ -2581,7 +2519,7 @@
           <a:p>
             <a:fld id="{C71581C8-DC5B-4BAA-A235-D61CE073C796}" type="datetimeFigureOut">
               <a:rPr lang="en-US" smtClean="0"/>
-              <a:t>6/8/2017</a:t>
+              <a:t>6/19/2017</a:t>
             </a:fld>
             <a:endParaRPr lang="en-US"/>
           </a:p>
@@ -2699,7 +2637,7 @@
           <a:p>
             <a:fld id="{C71581C8-DC5B-4BAA-A235-D61CE073C796}" type="datetimeFigureOut">
               <a:rPr lang="en-US" smtClean="0"/>
-              <a:t>6/8/2017</a:t>
+              <a:t>6/19/2017</a:t>
             </a:fld>
             <a:endParaRPr lang="en-US"/>
           </a:p>
@@ -2794,7 +2732,7 @@
           <a:p>
             <a:fld id="{C71581C8-DC5B-4BAA-A235-D61CE073C796}" type="datetimeFigureOut">
               <a:rPr lang="en-US" smtClean="0"/>
-              <a:t>6/8/2017</a:t>
+              <a:t>6/19/2017</a:t>
             </a:fld>
             <a:endParaRPr lang="en-US"/>
           </a:p>
@@ -3071,7 +3009,7 @@
           <a:p>
             <a:fld id="{C71581C8-DC5B-4BAA-A235-D61CE073C796}" type="datetimeFigureOut">
               <a:rPr lang="en-US" smtClean="0"/>
-              <a:t>6/8/2017</a:t>
+              <a:t>6/19/2017</a:t>
             </a:fld>
             <a:endParaRPr lang="en-US"/>
           </a:p>
@@ -3328,7 +3266,7 @@
           <a:p>
             <a:fld id="{C71581C8-DC5B-4BAA-A235-D61CE073C796}" type="datetimeFigureOut">
               <a:rPr lang="en-US" smtClean="0"/>
-              <a:t>6/8/2017</a:t>
+              <a:t>6/19/2017</a:t>
             </a:fld>
             <a:endParaRPr lang="en-US"/>
           </a:p>
@@ -3541,7 +3479,7 @@
           <a:p>
             <a:fld id="{C71581C8-DC5B-4BAA-A235-D61CE073C796}" type="datetimeFigureOut">
               <a:rPr lang="en-US" smtClean="0"/>
-              <a:t>6/8/2017</a:t>
+              <a:t>6/19/2017</a:t>
             </a:fld>
             <a:endParaRPr lang="en-US"/>
           </a:p>
@@ -3963,16 +3901,46 @@
         </p:nvSpPr>
         <p:spPr/>
         <p:txBody>
-          <a:bodyPr/>
-          <a:lstStyle/>
-          <a:p>
-            <a:r>
-              <a:rPr lang="en-US" dirty="0" err="1"/>
-              <a:t>AOPWiki</a:t>
-            </a:r>
+          <a:bodyPr>
+            <a:normAutofit fontScale="90000"/>
+          </a:bodyPr>
+          <a:lstStyle/>
+          <a:p>
+            <a:pPr algn="l"/>
+            <a:r>
+              <a:rPr lang="en-US" b="1" dirty="0"/>
+              <a:t>Adverse Outcome Pathway Network Analyses: Techniques and benchmarking the AOPwiki</a:t>
+            </a:r>
+            <a:endParaRPr lang="en-US" dirty="0"/>
+          </a:p>
+        </p:txBody>
+      </p:sp>
+      <p:sp>
+        <p:nvSpPr>
+          <p:cNvPr id="3" name="TextBox 2"/>
+          <p:cNvSpPr txBox="1"/>
+          <p:nvPr/>
+        </p:nvSpPr>
+        <p:spPr>
+          <a:xfrm>
+            <a:off x="1644015" y="3840480"/>
+            <a:ext cx="8903970" cy="369332"/>
+          </a:xfrm>
+          <a:prstGeom prst="rect">
+            <a:avLst/>
+          </a:prstGeom>
+          <a:noFill/>
+        </p:spPr>
+        <p:txBody>
+          <a:bodyPr wrap="square" rtlCol="0">
+            <a:spAutoFit/>
+          </a:bodyPr>
+          <a:lstStyle/>
+          <a:p>
+            <a:pPr algn="ctr"/>
             <a:r>
               <a:rPr lang="en-US" dirty="0"/>
-              <a:t> Network Analysis</a:t>
+              <a:t>Nate Pollesch, Jason O’ Brien, and Dan Villeneuve</a:t>
             </a:r>
           </a:p>
         </p:txBody>
@@ -5774,132 +5742,6 @@
 </p:sld>
 </file>
 
-<file path=ppt/slides/slide15.xml><?xml version="1.0" encoding="utf-8"?>
-<p:sld xmlns:a="http://schemas.openxmlformats.org/drawingml/2006/main" xmlns:r="http://schemas.openxmlformats.org/officeDocument/2006/relationships" xmlns:p="http://schemas.openxmlformats.org/presentationml/2006/main">
-  <p:cSld>
-    <p:spTree>
-      <p:nvGrpSpPr>
-        <p:cNvPr id="1" name=""/>
-        <p:cNvGrpSpPr/>
-        <p:nvPr/>
-      </p:nvGrpSpPr>
-      <p:grpSpPr>
-        <a:xfrm>
-          <a:off x="0" y="0"/>
-          <a:ext cx="0" cy="0"/>
-          <a:chOff x="0" y="0"/>
-          <a:chExt cx="0" cy="0"/>
-        </a:xfrm>
-      </p:grpSpPr>
-      <p:sp>
-        <p:nvSpPr>
-          <p:cNvPr id="2" name="Title 1"/>
-          <p:cNvSpPr>
-            <a:spLocks noGrp="1"/>
-          </p:cNvSpPr>
-          <p:nvPr>
-            <p:ph type="title"/>
-          </p:nvPr>
-        </p:nvSpPr>
-        <p:spPr/>
-        <p:txBody>
-          <a:bodyPr/>
-          <a:lstStyle/>
-          <a:p>
-            <a:r>
-              <a:rPr lang="en-US" dirty="0"/>
-              <a:t>Analyses to add	</a:t>
-            </a:r>
-          </a:p>
-        </p:txBody>
-      </p:sp>
-      <p:sp>
-        <p:nvSpPr>
-          <p:cNvPr id="3" name="Content Placeholder 2"/>
-          <p:cNvSpPr>
-            <a:spLocks noGrp="1"/>
-          </p:cNvSpPr>
-          <p:nvPr>
-            <p:ph idx="1"/>
-          </p:nvPr>
-        </p:nvSpPr>
-        <p:spPr/>
-        <p:txBody>
-          <a:bodyPr/>
-          <a:lstStyle/>
-          <a:p>
-            <a:r>
-              <a:rPr lang="en-US" dirty="0"/>
-              <a:t>Resilience measures?</a:t>
-            </a:r>
-          </a:p>
-          <a:p>
-            <a:pPr lvl="1"/>
-            <a:r>
-              <a:rPr lang="en-US" dirty="0"/>
-              <a:t>Node removal while maintaining connectivity </a:t>
-            </a:r>
-          </a:p>
-          <a:p>
-            <a:pPr lvl="1"/>
-            <a:r>
-              <a:rPr lang="en-US" dirty="0"/>
-              <a:t>General strength of AOP wiki</a:t>
-            </a:r>
-          </a:p>
-          <a:p>
-            <a:r>
-              <a:rPr lang="en-US" dirty="0"/>
-              <a:t>Annual growth or change of AOP wiki.  Can we do this retrospectively? </a:t>
-            </a:r>
-          </a:p>
-          <a:p>
-            <a:r>
-              <a:rPr lang="en-US" dirty="0"/>
-              <a:t>Make action items</a:t>
-            </a:r>
-          </a:p>
-          <a:p>
-            <a:pPr lvl="1"/>
-            <a:r>
-              <a:rPr lang="en-US" dirty="0"/>
-              <a:t>Reach out to Steven Edwards (wiki master) extend invite as co-author.</a:t>
-            </a:r>
-          </a:p>
-        </p:txBody>
-      </p:sp>
-      <p:sp>
-        <p:nvSpPr>
-          <p:cNvPr id="4" name="Text Placeholder 3"/>
-          <p:cNvSpPr>
-            <a:spLocks noGrp="1"/>
-          </p:cNvSpPr>
-          <p:nvPr>
-            <p:ph type="body" sz="half" idx="2"/>
-          </p:nvPr>
-        </p:nvSpPr>
-        <p:spPr/>
-        <p:txBody>
-          <a:bodyPr/>
-          <a:lstStyle/>
-          <a:p>
-            <a:endParaRPr lang="en-US"/>
-          </a:p>
-        </p:txBody>
-      </p:sp>
-    </p:spTree>
-    <p:extLst>
-      <p:ext uri="{BB962C8B-B14F-4D97-AF65-F5344CB8AC3E}">
-        <p14:creationId xmlns:p14="http://schemas.microsoft.com/office/powerpoint/2010/main" val="2447896441"/>
-      </p:ext>
-    </p:extLst>
-  </p:cSld>
-  <p:clrMapOvr>
-    <a:masterClrMapping/>
-  </p:clrMapOvr>
-</p:sld>
-</file>
-
 <file path=ppt/slides/slide2.xml><?xml version="1.0" encoding="utf-8"?>
 <p:sld xmlns:a="http://schemas.openxmlformats.org/drawingml/2006/main" xmlns:r="http://schemas.openxmlformats.org/officeDocument/2006/relationships" xmlns:p="http://schemas.openxmlformats.org/presentationml/2006/main">
   <p:cSld>
@@ -6204,12 +6046,6 @@
           </a:bodyPr>
           <a:lstStyle/>
           <a:p>
-            <a:r>
-              <a:rPr lang="en-US" dirty="0"/>
-              <a:t>The AOP wiki has:</a:t>
-            </a:r>
-          </a:p>
-          <a:p>
             <a:pPr marL="285750" indent="-285750">
               <a:buFont typeface="Arial" panose="020B0604020202020204" pitchFamily="34" charset="0"/>
               <a:buChar char="•"/>
@@ -6251,6 +6087,65 @@
           </a:p>
         </p:txBody>
       </p:sp>
+      <p:pic>
+        <p:nvPicPr>
+          <p:cNvPr id="3" name="Picture 2" descr="Screen Clipping"/>
+          <p:cNvPicPr>
+            <a:picLocks noChangeAspect="1"/>
+          </p:cNvPicPr>
+          <p:nvPr/>
+        </p:nvPicPr>
+        <p:blipFill rotWithShape="1">
+          <a:blip r:embed="rId6">
+            <a:extLst>
+              <a:ext uri="{28A0092B-C50C-407E-A947-70E740481C1C}">
+                <a14:useLocalDpi xmlns:a14="http://schemas.microsoft.com/office/drawing/2010/main" val="0"/>
+              </a:ext>
+            </a:extLst>
+          </a:blip>
+          <a:srcRect t="1063"/>
+          <a:stretch/>
+        </p:blipFill>
+        <p:spPr>
+          <a:xfrm>
+            <a:off x="5344025" y="61502"/>
+            <a:ext cx="6703195" cy="6785068"/>
+          </a:xfrm>
+          <a:prstGeom prst="rect">
+            <a:avLst/>
+          </a:prstGeom>
+        </p:spPr>
+      </p:pic>
+      <p:pic>
+        <p:nvPicPr>
+          <p:cNvPr id="6" name="Picture 5" descr="Screen Clipping"/>
+          <p:cNvPicPr>
+            <a:picLocks noChangeAspect="1"/>
+          </p:cNvPicPr>
+          <p:nvPr/>
+        </p:nvPicPr>
+        <p:blipFill>
+          <a:blip r:embed="rId7">
+            <a:extLst>
+              <a:ext uri="{28A0092B-C50C-407E-A947-70E740481C1C}">
+                <a14:useLocalDpi xmlns:a14="http://schemas.microsoft.com/office/drawing/2010/main" val="0"/>
+              </a:ext>
+            </a:extLst>
+          </a:blip>
+          <a:stretch>
+            <a:fillRect/>
+          </a:stretch>
+        </p:blipFill>
+        <p:spPr>
+          <a:xfrm>
+            <a:off x="574478" y="3107234"/>
+            <a:ext cx="4024259" cy="3750766"/>
+          </a:xfrm>
+          <a:prstGeom prst="rect">
+            <a:avLst/>
+          </a:prstGeom>
+        </p:spPr>
+      </p:pic>
     </p:spTree>
     <p:extLst>
       <p:ext uri="{BB962C8B-B14F-4D97-AF65-F5344CB8AC3E}">

</xml_diff>

<commit_message>
More updates for paper
</commit_message>
<xml_diff>
--- a/Presentations/AOPwiki_analysis.pptx
+++ b/Presentations/AOPwiki_analysis.pptx
@@ -5,7 +5,7 @@
     <p:sldMasterId id="2147483684" r:id="rId1"/>
   </p:sldMasterIdLst>
   <p:notesMasterIdLst>
-    <p:notesMasterId r:id="rId16"/>
+    <p:notesMasterId r:id="rId20"/>
   </p:notesMasterIdLst>
   <p:sldIdLst>
     <p:sldId id="256" r:id="rId2"/>
@@ -17,11 +17,15 @@
     <p:sldId id="267" r:id="rId8"/>
     <p:sldId id="265" r:id="rId9"/>
     <p:sldId id="262" r:id="rId10"/>
-    <p:sldId id="263" r:id="rId11"/>
-    <p:sldId id="269" r:id="rId12"/>
-    <p:sldId id="270" r:id="rId13"/>
-    <p:sldId id="271" r:id="rId14"/>
-    <p:sldId id="272" r:id="rId15"/>
+    <p:sldId id="273" r:id="rId11"/>
+    <p:sldId id="263" r:id="rId12"/>
+    <p:sldId id="269" r:id="rId13"/>
+    <p:sldId id="274" r:id="rId14"/>
+    <p:sldId id="270" r:id="rId15"/>
+    <p:sldId id="275" r:id="rId16"/>
+    <p:sldId id="271" r:id="rId17"/>
+    <p:sldId id="276" r:id="rId18"/>
+    <p:sldId id="272" r:id="rId19"/>
   </p:sldIdLst>
   <p:sldSz cx="12192000" cy="6858000"/>
   <p:notesSz cx="6858000" cy="9144000"/>
@@ -134,10 +138,14 @@
             <p14:sldId id="267"/>
             <p14:sldId id="265"/>
             <p14:sldId id="262"/>
+            <p14:sldId id="273"/>
             <p14:sldId id="263"/>
             <p14:sldId id="269"/>
+            <p14:sldId id="274"/>
             <p14:sldId id="270"/>
+            <p14:sldId id="275"/>
             <p14:sldId id="271"/>
+            <p14:sldId id="276"/>
             <p14:sldId id="272"/>
           </p14:sldIdLst>
         </p14:section>
@@ -870,13 +878,20 @@
           <a:p>
             <a:r>
               <a:rPr lang="en-US" dirty="0"/>
-              <a:t>To do: More specific</a:t>
+              <a:t>To do:</a:t>
             </a:r>
             <a:r>
               <a:rPr lang="en-US" baseline="0" dirty="0"/>
-              <a:t> information based on centrality measures.  Expand to include better information about KEs, maybe show top ten?</a:t>
-            </a:r>
-            <a:endParaRPr lang="en-US" dirty="0"/>
+              <a:t> </a:t>
+            </a:r>
+            <a:r>
+              <a:rPr lang="en-US" dirty="0"/>
+              <a:t>Create layout</a:t>
+            </a:r>
+            <a:r>
+              <a:rPr lang="en-US" baseline="0" dirty="0"/>
+              <a:t> for AOP networks based on level of biological organization. Can we do a similar analysis for MIE and AO?  What about KEs/KERs/AOPs by author?   </a:t>
+            </a:r>
           </a:p>
         </p:txBody>
       </p:sp>
@@ -897,7 +912,7 @@
           <a:p>
             <a:fld id="{8C5291EA-D524-4968-939F-FF9188A27C11}" type="slidenum">
               <a:rPr lang="en-US" smtClean="0"/>
-              <a:t>11</a:t>
+              <a:t>10</a:t>
             </a:fld>
             <a:endParaRPr lang="en-US"/>
           </a:p>
@@ -906,7 +921,7 @@
     </p:spTree>
     <p:extLst>
       <p:ext uri="{BB962C8B-B14F-4D97-AF65-F5344CB8AC3E}">
-        <p14:creationId xmlns:p14="http://schemas.microsoft.com/office/powerpoint/2010/main" val="4164765406"/>
+        <p14:creationId xmlns:p14="http://schemas.microsoft.com/office/powerpoint/2010/main" val="260849188"/>
       </p:ext>
     </p:extLst>
   </p:cSld>
@@ -962,11 +977,11 @@
           <a:p>
             <a:r>
               <a:rPr lang="en-US" dirty="0"/>
-              <a:t>To do: Incomplete AOP vs</a:t>
+              <a:t>To do: More specific</a:t>
             </a:r>
             <a:r>
               <a:rPr lang="en-US" baseline="0" dirty="0"/>
-              <a:t> Complete AOP and ability to identify AOs and MIEs.  With proper annotation we can use these analyses to identify complete vs incomplete AOPs.  </a:t>
+              <a:t> information based on centrality measures.  Expand to include better information about KEs, maybe show top ten?</a:t>
             </a:r>
             <a:endParaRPr lang="en-US" dirty="0"/>
           </a:p>
@@ -998,7 +1013,283 @@
     </p:spTree>
     <p:extLst>
       <p:ext uri="{BB962C8B-B14F-4D97-AF65-F5344CB8AC3E}">
+        <p14:creationId xmlns:p14="http://schemas.microsoft.com/office/powerpoint/2010/main" val="4164765406"/>
+      </p:ext>
+    </p:extLst>
+  </p:cSld>
+  <p:clrMapOvr>
+    <a:masterClrMapping/>
+  </p:clrMapOvr>
+</p:notes>
+</file>
+
+<file path=ppt/notesSlides/notesSlide6.xml><?xml version="1.0" encoding="utf-8"?>
+<p:notes xmlns:a="http://schemas.openxmlformats.org/drawingml/2006/main" xmlns:r="http://schemas.openxmlformats.org/officeDocument/2006/relationships" xmlns:p="http://schemas.openxmlformats.org/presentationml/2006/main">
+  <p:cSld>
+    <p:spTree>
+      <p:nvGrpSpPr>
+        <p:cNvPr id="1" name=""/>
+        <p:cNvGrpSpPr/>
+        <p:nvPr/>
+      </p:nvGrpSpPr>
+      <p:grpSpPr>
+        <a:xfrm>
+          <a:off x="0" y="0"/>
+          <a:ext cx="0" cy="0"/>
+          <a:chOff x="0" y="0"/>
+          <a:chExt cx="0" cy="0"/>
+        </a:xfrm>
+      </p:grpSpPr>
+      <p:sp>
+        <p:nvSpPr>
+          <p:cNvPr id="2" name="Slide Image Placeholder 1"/>
+          <p:cNvSpPr>
+            <a:spLocks noGrp="1" noRot="1" noChangeAspect="1"/>
+          </p:cNvSpPr>
+          <p:nvPr>
+            <p:ph type="sldImg"/>
+          </p:nvPr>
+        </p:nvSpPr>
+        <p:spPr/>
+      </p:sp>
+      <p:sp>
+        <p:nvSpPr>
+          <p:cNvPr id="3" name="Notes Placeholder 2"/>
+          <p:cNvSpPr>
+            <a:spLocks noGrp="1"/>
+          </p:cNvSpPr>
+          <p:nvPr>
+            <p:ph type="body" idx="1"/>
+          </p:nvPr>
+        </p:nvSpPr>
+        <p:spPr/>
+        <p:txBody>
+          <a:bodyPr/>
+          <a:lstStyle/>
+          <a:p>
+            <a:r>
+              <a:rPr lang="en-US" dirty="0"/>
+              <a:t>To do: More specific</a:t>
+            </a:r>
+            <a:r>
+              <a:rPr lang="en-US" baseline="0" dirty="0"/>
+              <a:t> information based on centrality measures.  Expand to include better information about KEs, maybe show top ten?</a:t>
+            </a:r>
+            <a:endParaRPr lang="en-US" dirty="0"/>
+          </a:p>
+        </p:txBody>
+      </p:sp>
+      <p:sp>
+        <p:nvSpPr>
+          <p:cNvPr id="4" name="Slide Number Placeholder 3"/>
+          <p:cNvSpPr>
+            <a:spLocks noGrp="1"/>
+          </p:cNvSpPr>
+          <p:nvPr>
+            <p:ph type="sldNum" sz="quarter" idx="10"/>
+          </p:nvPr>
+        </p:nvSpPr>
+        <p:spPr/>
+        <p:txBody>
+          <a:bodyPr/>
+          <a:lstStyle/>
+          <a:p>
+            <a:fld id="{8C5291EA-D524-4968-939F-FF9188A27C11}" type="slidenum">
+              <a:rPr lang="en-US" smtClean="0"/>
+              <a:t>13</a:t>
+            </a:fld>
+            <a:endParaRPr lang="en-US"/>
+          </a:p>
+        </p:txBody>
+      </p:sp>
+    </p:spTree>
+    <p:extLst>
+      <p:ext uri="{BB962C8B-B14F-4D97-AF65-F5344CB8AC3E}">
+        <p14:creationId xmlns:p14="http://schemas.microsoft.com/office/powerpoint/2010/main" val="779683296"/>
+      </p:ext>
+    </p:extLst>
+  </p:cSld>
+  <p:clrMapOvr>
+    <a:masterClrMapping/>
+  </p:clrMapOvr>
+</p:notes>
+</file>
+
+<file path=ppt/notesSlides/notesSlide7.xml><?xml version="1.0" encoding="utf-8"?>
+<p:notes xmlns:a="http://schemas.openxmlformats.org/drawingml/2006/main" xmlns:r="http://schemas.openxmlformats.org/officeDocument/2006/relationships" xmlns:p="http://schemas.openxmlformats.org/presentationml/2006/main">
+  <p:cSld>
+    <p:spTree>
+      <p:nvGrpSpPr>
+        <p:cNvPr id="1" name=""/>
+        <p:cNvGrpSpPr/>
+        <p:nvPr/>
+      </p:nvGrpSpPr>
+      <p:grpSpPr>
+        <a:xfrm>
+          <a:off x="0" y="0"/>
+          <a:ext cx="0" cy="0"/>
+          <a:chOff x="0" y="0"/>
+          <a:chExt cx="0" cy="0"/>
+        </a:xfrm>
+      </p:grpSpPr>
+      <p:sp>
+        <p:nvSpPr>
+          <p:cNvPr id="2" name="Slide Image Placeholder 1"/>
+          <p:cNvSpPr>
+            <a:spLocks noGrp="1" noRot="1" noChangeAspect="1"/>
+          </p:cNvSpPr>
+          <p:nvPr>
+            <p:ph type="sldImg"/>
+          </p:nvPr>
+        </p:nvSpPr>
+        <p:spPr/>
+      </p:sp>
+      <p:sp>
+        <p:nvSpPr>
+          <p:cNvPr id="3" name="Notes Placeholder 2"/>
+          <p:cNvSpPr>
+            <a:spLocks noGrp="1"/>
+          </p:cNvSpPr>
+          <p:nvPr>
+            <p:ph type="body" idx="1"/>
+          </p:nvPr>
+        </p:nvSpPr>
+        <p:spPr/>
+        <p:txBody>
+          <a:bodyPr/>
+          <a:lstStyle/>
+          <a:p>
+            <a:r>
+              <a:rPr lang="en-US" dirty="0"/>
+              <a:t>To do: Incomplete AOP vs</a:t>
+            </a:r>
+            <a:r>
+              <a:rPr lang="en-US" baseline="0" dirty="0"/>
+              <a:t> Complete AOP and ability to identify AOs and MIEs.  With proper annotation we can use these analyses to identify complete vs incomplete AOPs.  </a:t>
+            </a:r>
+            <a:endParaRPr lang="en-US" dirty="0"/>
+          </a:p>
+        </p:txBody>
+      </p:sp>
+      <p:sp>
+        <p:nvSpPr>
+          <p:cNvPr id="4" name="Slide Number Placeholder 3"/>
+          <p:cNvSpPr>
+            <a:spLocks noGrp="1"/>
+          </p:cNvSpPr>
+          <p:nvPr>
+            <p:ph type="sldNum" sz="quarter" idx="10"/>
+          </p:nvPr>
+        </p:nvSpPr>
+        <p:spPr/>
+        <p:txBody>
+          <a:bodyPr/>
+          <a:lstStyle/>
+          <a:p>
+            <a:fld id="{8C5291EA-D524-4968-939F-FF9188A27C11}" type="slidenum">
+              <a:rPr lang="en-US" smtClean="0"/>
+              <a:t>14</a:t>
+            </a:fld>
+            <a:endParaRPr lang="en-US"/>
+          </a:p>
+        </p:txBody>
+      </p:sp>
+    </p:spTree>
+    <p:extLst>
+      <p:ext uri="{BB962C8B-B14F-4D97-AF65-F5344CB8AC3E}">
         <p14:creationId xmlns:p14="http://schemas.microsoft.com/office/powerpoint/2010/main" val="3551145391"/>
+      </p:ext>
+    </p:extLst>
+  </p:cSld>
+  <p:clrMapOvr>
+    <a:masterClrMapping/>
+  </p:clrMapOvr>
+</p:notes>
+</file>
+
+<file path=ppt/notesSlides/notesSlide8.xml><?xml version="1.0" encoding="utf-8"?>
+<p:notes xmlns:a="http://schemas.openxmlformats.org/drawingml/2006/main" xmlns:r="http://schemas.openxmlformats.org/officeDocument/2006/relationships" xmlns:p="http://schemas.openxmlformats.org/presentationml/2006/main">
+  <p:cSld>
+    <p:spTree>
+      <p:nvGrpSpPr>
+        <p:cNvPr id="1" name=""/>
+        <p:cNvGrpSpPr/>
+        <p:nvPr/>
+      </p:nvGrpSpPr>
+      <p:grpSpPr>
+        <a:xfrm>
+          <a:off x="0" y="0"/>
+          <a:ext cx="0" cy="0"/>
+          <a:chOff x="0" y="0"/>
+          <a:chExt cx="0" cy="0"/>
+        </a:xfrm>
+      </p:grpSpPr>
+      <p:sp>
+        <p:nvSpPr>
+          <p:cNvPr id="2" name="Slide Image Placeholder 1"/>
+          <p:cNvSpPr>
+            <a:spLocks noGrp="1" noRot="1" noChangeAspect="1"/>
+          </p:cNvSpPr>
+          <p:nvPr>
+            <p:ph type="sldImg"/>
+          </p:nvPr>
+        </p:nvSpPr>
+        <p:spPr/>
+      </p:sp>
+      <p:sp>
+        <p:nvSpPr>
+          <p:cNvPr id="3" name="Notes Placeholder 2"/>
+          <p:cNvSpPr>
+            <a:spLocks noGrp="1"/>
+          </p:cNvSpPr>
+          <p:nvPr>
+            <p:ph type="body" idx="1"/>
+          </p:nvPr>
+        </p:nvSpPr>
+        <p:spPr/>
+        <p:txBody>
+          <a:bodyPr/>
+          <a:lstStyle/>
+          <a:p>
+            <a:r>
+              <a:rPr lang="en-US" dirty="0"/>
+              <a:t>To do: Incomplete AOP vs</a:t>
+            </a:r>
+            <a:r>
+              <a:rPr lang="en-US" baseline="0" dirty="0"/>
+              <a:t> Complete AOP and ability to identify AOs and MIEs.  With proper annotation we can use these analyses to identify complete vs incomplete AOPs.  </a:t>
+            </a:r>
+            <a:endParaRPr lang="en-US" dirty="0"/>
+          </a:p>
+        </p:txBody>
+      </p:sp>
+      <p:sp>
+        <p:nvSpPr>
+          <p:cNvPr id="4" name="Slide Number Placeholder 3"/>
+          <p:cNvSpPr>
+            <a:spLocks noGrp="1"/>
+          </p:cNvSpPr>
+          <p:nvPr>
+            <p:ph type="sldNum" sz="quarter" idx="10"/>
+          </p:nvPr>
+        </p:nvSpPr>
+        <p:spPr/>
+        <p:txBody>
+          <a:bodyPr/>
+          <a:lstStyle/>
+          <a:p>
+            <a:fld id="{8C5291EA-D524-4968-939F-FF9188A27C11}" type="slidenum">
+              <a:rPr lang="en-US" smtClean="0"/>
+              <a:t>15</a:t>
+            </a:fld>
+            <a:endParaRPr lang="en-US"/>
+          </a:p>
+        </p:txBody>
+      </p:sp>
+    </p:spTree>
+    <p:extLst>
+      <p:ext uri="{BB962C8B-B14F-4D97-AF65-F5344CB8AC3E}">
+        <p14:creationId xmlns:p14="http://schemas.microsoft.com/office/powerpoint/2010/main" val="526647806"/>
       </p:ext>
     </p:extLst>
   </p:cSld>
@@ -3985,6 +4276,236 @@
             <p:ph type="title"/>
           </p:nvPr>
         </p:nvSpPr>
+        <p:spPr>
+          <a:xfrm>
+            <a:off x="7278688" y="827501"/>
+            <a:ext cx="3932237" cy="739074"/>
+          </a:xfrm>
+        </p:spPr>
+        <p:txBody>
+          <a:bodyPr>
+            <a:normAutofit fontScale="90000"/>
+          </a:bodyPr>
+          <a:lstStyle/>
+          <a:p>
+            <a:r>
+              <a:rPr lang="en-US" dirty="0"/>
+              <a:t>Levels of Biological Organization in the </a:t>
+            </a:r>
+            <a:r>
+              <a:rPr lang="en-US" dirty="0" err="1"/>
+              <a:t>AOPwiki</a:t>
+            </a:r>
+            <a:r>
+              <a:rPr lang="en-US" dirty="0"/>
+              <a:t> network</a:t>
+            </a:r>
+          </a:p>
+        </p:txBody>
+      </p:sp>
+      <p:sp>
+        <p:nvSpPr>
+          <p:cNvPr id="4" name="Text Placeholder 3"/>
+          <p:cNvSpPr>
+            <a:spLocks noGrp="1"/>
+          </p:cNvSpPr>
+          <p:nvPr>
+            <p:ph type="body" sz="half" idx="2"/>
+          </p:nvPr>
+        </p:nvSpPr>
+        <p:spPr>
+          <a:xfrm>
+            <a:off x="7278688" y="1566575"/>
+            <a:ext cx="3932237" cy="3811588"/>
+          </a:xfrm>
+        </p:spPr>
+        <p:txBody>
+          <a:bodyPr/>
+          <a:lstStyle/>
+          <a:p>
+            <a:r>
+              <a:rPr lang="en-US" dirty="0"/>
+              <a:t>Colors represent levels of biological organization associated to Key Events in the </a:t>
+            </a:r>
+            <a:r>
+              <a:rPr lang="en-US" dirty="0" err="1"/>
+              <a:t>AOPwiki</a:t>
+            </a:r>
+            <a:r>
+              <a:rPr lang="en-US" dirty="0"/>
+              <a:t>. A total of 750 unique key events are in the wiki, 53 Key events in the </a:t>
+            </a:r>
+            <a:r>
+              <a:rPr lang="en-US" dirty="0" err="1"/>
+              <a:t>AOPwiki</a:t>
+            </a:r>
+            <a:r>
+              <a:rPr lang="en-US" dirty="0"/>
+              <a:t> had unspecified levels of biological organization</a:t>
+            </a:r>
+          </a:p>
+        </p:txBody>
+      </p:sp>
+      <p:pic>
+        <p:nvPicPr>
+          <p:cNvPr id="21" name="Picture 20" descr="Screen Clipping"/>
+          <p:cNvPicPr>
+            <a:picLocks noChangeAspect="1"/>
+          </p:cNvPicPr>
+          <p:nvPr/>
+        </p:nvPicPr>
+        <p:blipFill>
+          <a:blip r:embed="rId3">
+            <a:extLst>
+              <a:ext uri="{28A0092B-C50C-407E-A947-70E740481C1C}">
+                <a14:useLocalDpi xmlns:a14="http://schemas.microsoft.com/office/drawing/2010/main" val="0"/>
+              </a:ext>
+            </a:extLst>
+          </a:blip>
+          <a:stretch>
+            <a:fillRect/>
+          </a:stretch>
+        </p:blipFill>
+        <p:spPr>
+          <a:xfrm>
+            <a:off x="0" y="61373"/>
+            <a:ext cx="6834368" cy="6643560"/>
+          </a:xfrm>
+          <a:prstGeom prst="rect">
+            <a:avLst/>
+          </a:prstGeom>
+        </p:spPr>
+      </p:pic>
+      <p:pic>
+        <p:nvPicPr>
+          <p:cNvPr id="26" name="Picture 25" descr="Screen Clipping"/>
+          <p:cNvPicPr>
+            <a:picLocks noChangeAspect="1"/>
+          </p:cNvPicPr>
+          <p:nvPr/>
+        </p:nvPicPr>
+        <p:blipFill>
+          <a:blip r:embed="rId4">
+            <a:extLst>
+              <a:ext uri="{28A0092B-C50C-407E-A947-70E740481C1C}">
+                <a14:useLocalDpi xmlns:a14="http://schemas.microsoft.com/office/drawing/2010/main" val="0"/>
+              </a:ext>
+            </a:extLst>
+          </a:blip>
+          <a:stretch>
+            <a:fillRect/>
+          </a:stretch>
+        </p:blipFill>
+        <p:spPr>
+          <a:xfrm>
+            <a:off x="7336342" y="2824842"/>
+            <a:ext cx="2960192" cy="3880091"/>
+          </a:xfrm>
+          <a:prstGeom prst="rect">
+            <a:avLst/>
+          </a:prstGeom>
+        </p:spPr>
+      </p:pic>
+      <p:pic>
+        <p:nvPicPr>
+          <p:cNvPr id="23" name="Picture 22" descr="Screen Clipping"/>
+          <p:cNvPicPr>
+            <a:picLocks noChangeAspect="1"/>
+          </p:cNvPicPr>
+          <p:nvPr/>
+        </p:nvPicPr>
+        <p:blipFill>
+          <a:blip r:embed="rId5">
+            <a:extLst>
+              <a:ext uri="{28A0092B-C50C-407E-A947-70E740481C1C}">
+                <a14:useLocalDpi xmlns:a14="http://schemas.microsoft.com/office/drawing/2010/main" val="0"/>
+              </a:ext>
+            </a:extLst>
+          </a:blip>
+          <a:stretch>
+            <a:fillRect/>
+          </a:stretch>
+        </p:blipFill>
+        <p:spPr>
+          <a:xfrm>
+            <a:off x="9334946" y="2824842"/>
+            <a:ext cx="1745376" cy="1756784"/>
+          </a:xfrm>
+          <a:prstGeom prst="rect">
+            <a:avLst/>
+          </a:prstGeom>
+        </p:spPr>
+      </p:pic>
+      <p:pic>
+        <p:nvPicPr>
+          <p:cNvPr id="3" name="Picture 2" descr="Screen Clipping"/>
+          <p:cNvPicPr>
+            <a:picLocks noChangeAspect="1"/>
+          </p:cNvPicPr>
+          <p:nvPr/>
+        </p:nvPicPr>
+        <p:blipFill>
+          <a:blip r:embed="rId6">
+            <a:extLst>
+              <a:ext uri="{28A0092B-C50C-407E-A947-70E740481C1C}">
+                <a14:useLocalDpi xmlns:a14="http://schemas.microsoft.com/office/drawing/2010/main" val="0"/>
+              </a:ext>
+            </a:extLst>
+          </a:blip>
+          <a:stretch>
+            <a:fillRect/>
+          </a:stretch>
+        </p:blipFill>
+        <p:spPr>
+          <a:xfrm>
+            <a:off x="100295" y="0"/>
+            <a:ext cx="7207220" cy="6796627"/>
+          </a:xfrm>
+          <a:prstGeom prst="rect">
+            <a:avLst/>
+          </a:prstGeom>
+        </p:spPr>
+      </p:pic>
+    </p:spTree>
+    <p:extLst>
+      <p:ext uri="{BB962C8B-B14F-4D97-AF65-F5344CB8AC3E}">
+        <p14:creationId xmlns:p14="http://schemas.microsoft.com/office/powerpoint/2010/main" val="2342226250"/>
+      </p:ext>
+    </p:extLst>
+  </p:cSld>
+  <p:clrMapOvr>
+    <a:masterClrMapping/>
+  </p:clrMapOvr>
+</p:sld>
+</file>
+
+<file path=ppt/slides/slide11.xml><?xml version="1.0" encoding="utf-8"?>
+<p:sld xmlns:a="http://schemas.openxmlformats.org/drawingml/2006/main" xmlns:r="http://schemas.openxmlformats.org/officeDocument/2006/relationships" xmlns:p="http://schemas.openxmlformats.org/presentationml/2006/main">
+  <p:cSld>
+    <p:spTree>
+      <p:nvGrpSpPr>
+        <p:cNvPr id="1" name=""/>
+        <p:cNvGrpSpPr/>
+        <p:nvPr/>
+      </p:nvGrpSpPr>
+      <p:grpSpPr>
+        <a:xfrm>
+          <a:off x="0" y="0"/>
+          <a:ext cx="0" cy="0"/>
+          <a:chOff x="0" y="0"/>
+          <a:chExt cx="0" cy="0"/>
+        </a:xfrm>
+      </p:grpSpPr>
+      <p:sp>
+        <p:nvSpPr>
+          <p:cNvPr id="2" name="Title 1"/>
+          <p:cNvSpPr>
+            <a:spLocks noGrp="1"/>
+          </p:cNvSpPr>
+          <p:nvPr>
+            <p:ph type="title"/>
+          </p:nvPr>
+        </p:nvSpPr>
         <p:spPr/>
         <p:txBody>
           <a:bodyPr vert="horz" lIns="91440" tIns="45720" rIns="91440" bIns="45720" rtlCol="0" anchor="b">
@@ -4165,7 +4686,7 @@
 </p:sld>
 </file>
 
-<file path=ppt/slides/slide11.xml><?xml version="1.0" encoding="utf-8"?>
+<file path=ppt/slides/slide12.xml><?xml version="1.0" encoding="utf-8"?>
 <p:sld xmlns:a="http://schemas.openxmlformats.org/drawingml/2006/main" xmlns:r="http://schemas.openxmlformats.org/officeDocument/2006/relationships" xmlns:p="http://schemas.openxmlformats.org/presentationml/2006/main">
   <p:cSld>
     <p:spTree>
@@ -4439,7 +4960,608 @@
 </p:sld>
 </file>
 
-<file path=ppt/slides/slide12.xml><?xml version="1.0" encoding="utf-8"?>
+<file path=ppt/slides/slide13.xml><?xml version="1.0" encoding="utf-8"?>
+<p:sld xmlns:a="http://schemas.openxmlformats.org/drawingml/2006/main" xmlns:r="http://schemas.openxmlformats.org/officeDocument/2006/relationships" xmlns:p="http://schemas.openxmlformats.org/presentationml/2006/main">
+  <p:cSld>
+    <p:spTree>
+      <p:nvGrpSpPr>
+        <p:cNvPr id="1" name=""/>
+        <p:cNvGrpSpPr/>
+        <p:nvPr/>
+      </p:nvGrpSpPr>
+      <p:grpSpPr>
+        <a:xfrm>
+          <a:off x="0" y="0"/>
+          <a:ext cx="0" cy="0"/>
+          <a:chOff x="0" y="0"/>
+          <a:chExt cx="0" cy="0"/>
+        </a:xfrm>
+      </p:grpSpPr>
+      <p:sp>
+        <p:nvSpPr>
+          <p:cNvPr id="2" name="Title 1"/>
+          <p:cNvSpPr>
+            <a:spLocks noGrp="1"/>
+          </p:cNvSpPr>
+          <p:nvPr>
+            <p:ph type="title"/>
+          </p:nvPr>
+        </p:nvSpPr>
+        <p:spPr>
+          <a:xfrm>
+            <a:off x="7278688" y="37148"/>
+            <a:ext cx="3932237" cy="739074"/>
+          </a:xfrm>
+        </p:spPr>
+        <p:txBody>
+          <a:bodyPr>
+            <a:normAutofit/>
+          </a:bodyPr>
+          <a:lstStyle/>
+          <a:p>
+            <a:r>
+              <a:rPr lang="en-US" dirty="0"/>
+              <a:t>Degree (all) </a:t>
+            </a:r>
+            <a:r>
+              <a:rPr lang="en-US" dirty="0" err="1"/>
+              <a:t>Heatmap</a:t>
+            </a:r>
+            <a:endParaRPr lang="en-US" dirty="0"/>
+          </a:p>
+        </p:txBody>
+      </p:sp>
+      <mc:AlternateContent xmlns:mc="http://schemas.openxmlformats.org/markup-compatibility/2006" xmlns:a14="http://schemas.microsoft.com/office/drawing/2010/main">
+        <mc:Choice Requires="a14">
+          <p:sp>
+            <p:nvSpPr>
+              <p:cNvPr id="4" name="Text Placeholder 3"/>
+              <p:cNvSpPr>
+                <a:spLocks noGrp="1"/>
+              </p:cNvSpPr>
+              <p:nvPr>
+                <p:ph type="body" sz="half" idx="2"/>
+              </p:nvPr>
+            </p:nvSpPr>
+            <p:spPr>
+              <a:xfrm>
+                <a:off x="7278688" y="776222"/>
+                <a:ext cx="3932237" cy="3811588"/>
+              </a:xfrm>
+            </p:spPr>
+            <p:txBody>
+              <a:bodyPr/>
+              <a:lstStyle/>
+              <a:p>
+                <a:r>
+                  <a:rPr lang="en-US" dirty="0"/>
+                  <a:t>The degree (all), </a:t>
+                </a:r>
+                <a14:m>
+                  <m:oMath xmlns:m="http://schemas.openxmlformats.org/officeDocument/2006/math">
+                    <m:sSub>
+                      <m:sSubPr>
+                        <m:ctrlPr>
+                          <a:rPr lang="en-US" b="0" i="1" smtClean="0">
+                            <a:latin typeface="Cambria Math" panose="02040503050406030204" pitchFamily="18" charset="0"/>
+                          </a:rPr>
+                        </m:ctrlPr>
+                      </m:sSubPr>
+                      <m:e>
+                        <m:r>
+                          <a:rPr lang="en-US" b="0" i="1" smtClean="0">
+                            <a:latin typeface="Cambria Math" panose="02040503050406030204" pitchFamily="18" charset="0"/>
+                          </a:rPr>
+                          <m:t>𝐷</m:t>
+                        </m:r>
+                      </m:e>
+                      <m:sub>
+                        <m:r>
+                          <a:rPr lang="en-US" b="0" i="1" smtClean="0">
+                            <a:latin typeface="Cambria Math" panose="02040503050406030204" pitchFamily="18" charset="0"/>
+                          </a:rPr>
+                          <m:t>𝑎𝑙𝑙</m:t>
+                        </m:r>
+                      </m:sub>
+                    </m:sSub>
+                  </m:oMath>
+                </a14:m>
+                <a:r>
+                  <a:rPr lang="en-US" dirty="0"/>
+                  <a:t> of a node is the number of adjacent edges, regardless of directionality.  In this case, the key event with the highest </a:t>
+                </a:r>
+                <a14:m>
+                  <m:oMath xmlns:m="http://schemas.openxmlformats.org/officeDocument/2006/math">
+                    <m:sSub>
+                      <m:sSubPr>
+                        <m:ctrlPr>
+                          <a:rPr lang="en-US" b="0" i="1" smtClean="0">
+                            <a:latin typeface="Cambria Math" panose="02040503050406030204" pitchFamily="18" charset="0"/>
+                          </a:rPr>
+                        </m:ctrlPr>
+                      </m:sSubPr>
+                      <m:e>
+                        <m:r>
+                          <a:rPr lang="en-US" b="0" i="1" smtClean="0">
+                            <a:latin typeface="Cambria Math" panose="02040503050406030204" pitchFamily="18" charset="0"/>
+                          </a:rPr>
+                          <m:t>𝐷</m:t>
+                        </m:r>
+                      </m:e>
+                      <m:sub>
+                        <m:r>
+                          <a:rPr lang="en-US" b="0" i="1" smtClean="0">
+                            <a:latin typeface="Cambria Math" panose="02040503050406030204" pitchFamily="18" charset="0"/>
+                          </a:rPr>
+                          <m:t>𝑎𝑙𝑙</m:t>
+                        </m:r>
+                      </m:sub>
+                    </m:sSub>
+                  </m:oMath>
+                </a14:m>
+                <a:r>
+                  <a:rPr lang="en-US" dirty="0"/>
+                  <a:t> is </a:t>
+                </a:r>
+                <a:r>
+                  <a:rPr lang="en-US" sz="1800" b="1" dirty="0">
+                    <a:solidFill>
+                      <a:srgbClr val="FF0000"/>
+                    </a:solidFill>
+                  </a:rPr>
+                  <a:t>Increased oxidative stress</a:t>
+                </a:r>
+                <a:r>
+                  <a:rPr lang="en-US" i="1" dirty="0"/>
+                  <a:t>, </a:t>
+                </a:r>
+                <a:r>
+                  <a:rPr lang="en-US" dirty="0"/>
+                  <a:t>with 22 incident edges.</a:t>
+                </a:r>
+              </a:p>
+            </p:txBody>
+          </p:sp>
+        </mc:Choice>
+        <mc:Fallback xmlns="">
+          <p:sp>
+            <p:nvSpPr>
+              <p:cNvPr id="4" name="Text Placeholder 3"/>
+              <p:cNvSpPr>
+                <a:spLocks noGrp="1" noRot="1" noChangeAspect="1" noMove="1" noResize="1" noEditPoints="1" noAdjustHandles="1" noChangeArrowheads="1" noChangeShapeType="1" noTextEdit="1"/>
+              </p:cNvSpPr>
+              <p:nvPr>
+                <p:ph type="body" sz="half" idx="2"/>
+              </p:nvPr>
+            </p:nvSpPr>
+            <p:spPr>
+              <a:xfrm>
+                <a:off x="7278688" y="776222"/>
+                <a:ext cx="3932237" cy="3811588"/>
+              </a:xfrm>
+              <a:blipFill>
+                <a:blip r:embed="rId3"/>
+                <a:stretch>
+                  <a:fillRect l="-1240" t="-1118" r="-2016"/>
+                </a:stretch>
+              </a:blipFill>
+            </p:spPr>
+            <p:txBody>
+              <a:bodyPr/>
+              <a:lstStyle/>
+              <a:p>
+                <a:r>
+                  <a:rPr lang="en-US">
+                    <a:noFill/>
+                  </a:rPr>
+                  <a:t> </a:t>
+                </a:r>
+              </a:p>
+            </p:txBody>
+          </p:sp>
+        </mc:Fallback>
+      </mc:AlternateContent>
+      <p:pic>
+        <p:nvPicPr>
+          <p:cNvPr id="9" name="Picture 8" descr="Screen Clipping"/>
+          <p:cNvPicPr>
+            <a:picLocks noChangeAspect="1"/>
+          </p:cNvPicPr>
+          <p:nvPr/>
+        </p:nvPicPr>
+        <p:blipFill>
+          <a:blip r:embed="rId4">
+            <a:extLst>
+              <a:ext uri="{28A0092B-C50C-407E-A947-70E740481C1C}">
+                <a14:useLocalDpi xmlns:a14="http://schemas.microsoft.com/office/drawing/2010/main" val="0"/>
+              </a:ext>
+            </a:extLst>
+          </a:blip>
+          <a:stretch>
+            <a:fillRect/>
+          </a:stretch>
+        </p:blipFill>
+        <p:spPr>
+          <a:xfrm>
+            <a:off x="6995191" y="2271456"/>
+            <a:ext cx="4499230" cy="4354297"/>
+          </a:xfrm>
+          <a:prstGeom prst="rect">
+            <a:avLst/>
+          </a:prstGeom>
+        </p:spPr>
+      </p:pic>
+      <mc:AlternateContent xmlns:mc="http://schemas.openxmlformats.org/markup-compatibility/2006">
+        <mc:Choice xmlns:a14="http://schemas.microsoft.com/office/drawing/2010/main" Requires="a14">
+          <p:sp>
+            <p:nvSpPr>
+              <p:cNvPr id="5" name="Rectangle 4"/>
+              <p:cNvSpPr/>
+              <p:nvPr/>
+            </p:nvSpPr>
+            <p:spPr>
+              <a:xfrm>
+                <a:off x="615695" y="2066419"/>
+                <a:ext cx="6096000" cy="3139321"/>
+              </a:xfrm>
+              <a:prstGeom prst="rect">
+                <a:avLst/>
+              </a:prstGeom>
+            </p:spPr>
+            <p:txBody>
+              <a:bodyPr>
+                <a:spAutoFit/>
+              </a:bodyPr>
+              <a:lstStyle/>
+              <a:p>
+                <a:r>
+                  <a:rPr lang="en-US" b="1" dirty="0"/>
+                  <a:t>Key Event Name</a:t>
+                </a:r>
+              </a:p>
+              <a:p>
+                <a:r>
+                  <a:rPr lang="en-US" dirty="0"/>
+                  <a:t> "Increase, Oxidative Stress"              </a:t>
+                </a:r>
+              </a:p>
+              <a:p>
+                <a:r>
+                  <a:rPr lang="en-US" dirty="0"/>
+                  <a:t> "Increased, Mortality"                    </a:t>
+                </a:r>
+              </a:p>
+              <a:p>
+                <a:r>
+                  <a:rPr lang="en-US" dirty="0"/>
+                  <a:t> "N/A, Mitochondrial dysfunction 1"        </a:t>
+                </a:r>
+              </a:p>
+              <a:p>
+                <a:r>
+                  <a:rPr lang="en-US" dirty="0"/>
+                  <a:t> "Activation, PPAR</a:t>
+                </a:r>
+                <a14:m>
+                  <m:oMath xmlns:m="http://schemas.openxmlformats.org/officeDocument/2006/math">
+                    <m:r>
+                      <a:rPr lang="en-US" b="0" i="1" smtClean="0">
+                        <a:latin typeface="Cambria Math" panose="02040503050406030204" pitchFamily="18" charset="0"/>
+                      </a:rPr>
+                      <m:t>𝛼</m:t>
+                    </m:r>
+                  </m:oMath>
+                </a14:m>
+                <a:r>
+                  <a:rPr lang="en-US" dirty="0"/>
+                  <a:t>"                       </a:t>
+                </a:r>
+              </a:p>
+              <a:p>
+                <a:r>
+                  <a:rPr lang="en-US" dirty="0"/>
+                  <a:t> "Activation, LXR"                         </a:t>
+                </a:r>
+              </a:p>
+              <a:p>
+                <a:r>
+                  <a:rPr lang="en-US" dirty="0"/>
+                  <a:t> "Accumulation, Fatty acid"                </a:t>
+                </a:r>
+              </a:p>
+              <a:p>
+                <a:r>
+                  <a:rPr lang="en-US" dirty="0"/>
+                  <a:t> "Activation, AHR"                         </a:t>
+                </a:r>
+              </a:p>
+              <a:p>
+                <a:r>
+                  <a:rPr lang="en-US" dirty="0"/>
+                  <a:t> "Increase, cilia movement"                </a:t>
+                </a:r>
+              </a:p>
+              <a:p>
+                <a:r>
+                  <a:rPr lang="en-US" dirty="0"/>
+                  <a:t> "Increased, valve movement"               </a:t>
+                </a:r>
+              </a:p>
+              <a:p>
+                <a:r>
+                  <a:rPr lang="en-US" dirty="0"/>
+                  <a:t> "Abnormal, Foraging activity and behavior"</a:t>
+                </a:r>
+              </a:p>
+            </p:txBody>
+          </p:sp>
+        </mc:Choice>
+        <mc:Fallback>
+          <p:sp>
+            <p:nvSpPr>
+              <p:cNvPr id="5" name="Rectangle 4"/>
+              <p:cNvSpPr>
+                <a:spLocks noRot="1" noChangeAspect="1" noMove="1" noResize="1" noEditPoints="1" noAdjustHandles="1" noChangeArrowheads="1" noChangeShapeType="1" noTextEdit="1"/>
+              </p:cNvSpPr>
+              <p:nvPr/>
+            </p:nvSpPr>
+            <p:spPr>
+              <a:xfrm>
+                <a:off x="615695" y="2066419"/>
+                <a:ext cx="6096000" cy="3139321"/>
+              </a:xfrm>
+              <a:prstGeom prst="rect">
+                <a:avLst/>
+              </a:prstGeom>
+              <a:blipFill>
+                <a:blip r:embed="rId5"/>
+                <a:stretch>
+                  <a:fillRect l="-800" t="-1165" b="-2136"/>
+                </a:stretch>
+              </a:blipFill>
+            </p:spPr>
+            <p:txBody>
+              <a:bodyPr/>
+              <a:lstStyle/>
+              <a:p>
+                <a:r>
+                  <a:rPr lang="en-US">
+                    <a:noFill/>
+                  </a:rPr>
+                  <a:t> </a:t>
+                </a:r>
+              </a:p>
+            </p:txBody>
+          </p:sp>
+        </mc:Fallback>
+      </mc:AlternateContent>
+      <mc:AlternateContent xmlns:mc="http://schemas.openxmlformats.org/markup-compatibility/2006">
+        <mc:Choice xmlns:a14="http://schemas.microsoft.com/office/drawing/2010/main" Requires="a14">
+          <p:sp>
+            <p:nvSpPr>
+              <p:cNvPr id="7" name="Rectangle 6"/>
+              <p:cNvSpPr/>
+              <p:nvPr/>
+            </p:nvSpPr>
+            <p:spPr>
+              <a:xfrm>
+                <a:off x="5178359" y="2066419"/>
+                <a:ext cx="582362" cy="3139321"/>
+              </a:xfrm>
+              <a:prstGeom prst="rect">
+                <a:avLst/>
+              </a:prstGeom>
+            </p:spPr>
+            <p:txBody>
+              <a:bodyPr wrap="square">
+                <a:spAutoFit/>
+              </a:bodyPr>
+              <a:lstStyle/>
+              <a:p>
+                <a:pPr algn="ctr"/>
+                <a14:m>
+                  <m:oMathPara xmlns:m="http://schemas.openxmlformats.org/officeDocument/2006/math">
+                    <m:oMathParaPr>
+                      <m:jc m:val="centerGroup"/>
+                    </m:oMathParaPr>
+                    <m:oMath xmlns:m="http://schemas.openxmlformats.org/officeDocument/2006/math">
+                      <m:sSub>
+                        <m:sSubPr>
+                          <m:ctrlPr>
+                            <a:rPr lang="en-US" b="1" i="1" smtClean="0">
+                              <a:latin typeface="Cambria Math" panose="02040503050406030204" pitchFamily="18" charset="0"/>
+                            </a:rPr>
+                          </m:ctrlPr>
+                        </m:sSubPr>
+                        <m:e>
+                          <m:r>
+                            <a:rPr lang="en-US" b="1" i="1" smtClean="0">
+                              <a:latin typeface="Cambria Math" panose="02040503050406030204" pitchFamily="18" charset="0"/>
+                            </a:rPr>
+                            <m:t>𝑫</m:t>
+                          </m:r>
+                        </m:e>
+                        <m:sub>
+                          <m:r>
+                            <a:rPr lang="en-US" b="1" i="1" smtClean="0">
+                              <a:latin typeface="Cambria Math" panose="02040503050406030204" pitchFamily="18" charset="0"/>
+                            </a:rPr>
+                            <m:t>𝒂𝒍𝒍</m:t>
+                          </m:r>
+                        </m:sub>
+                      </m:sSub>
+                    </m:oMath>
+                  </m:oMathPara>
+                </a14:m>
+                <a:endParaRPr lang="en-US" b="1" dirty="0"/>
+              </a:p>
+              <a:p>
+                <a:pPr algn="ctr"/>
+                <a:r>
+                  <a:rPr lang="en-US" dirty="0"/>
+                  <a:t>22 17 15 13 12 12 12 11 10 10</a:t>
+                </a:r>
+              </a:p>
+            </p:txBody>
+          </p:sp>
+        </mc:Choice>
+        <mc:Fallback>
+          <p:sp>
+            <p:nvSpPr>
+              <p:cNvPr id="7" name="Rectangle 6"/>
+              <p:cNvSpPr>
+                <a:spLocks noRot="1" noChangeAspect="1" noMove="1" noResize="1" noEditPoints="1" noAdjustHandles="1" noChangeArrowheads="1" noChangeShapeType="1" noTextEdit="1"/>
+              </p:cNvSpPr>
+              <p:nvPr/>
+            </p:nvSpPr>
+            <p:spPr>
+              <a:xfrm>
+                <a:off x="5178359" y="2066419"/>
+                <a:ext cx="582362" cy="3139321"/>
+              </a:xfrm>
+              <a:prstGeom prst="rect">
+                <a:avLst/>
+              </a:prstGeom>
+              <a:blipFill>
+                <a:blip r:embed="rId6"/>
+                <a:stretch>
+                  <a:fillRect l="-3125" b="-2136"/>
+                </a:stretch>
+              </a:blipFill>
+            </p:spPr>
+            <p:txBody>
+              <a:bodyPr/>
+              <a:lstStyle/>
+              <a:p>
+                <a:r>
+                  <a:rPr lang="en-US">
+                    <a:noFill/>
+                  </a:rPr>
+                  <a:t> </a:t>
+                </a:r>
+              </a:p>
+            </p:txBody>
+          </p:sp>
+        </mc:Fallback>
+      </mc:AlternateContent>
+      <mc:AlternateContent xmlns:mc="http://schemas.openxmlformats.org/markup-compatibility/2006">
+        <mc:Choice xmlns:a14="http://schemas.microsoft.com/office/drawing/2010/main" Requires="a14">
+          <p:sp>
+            <p:nvSpPr>
+              <p:cNvPr id="10" name="TextBox 9"/>
+              <p:cNvSpPr txBox="1"/>
+              <p:nvPr/>
+            </p:nvSpPr>
+            <p:spPr>
+              <a:xfrm>
+                <a:off x="615695" y="1543199"/>
+                <a:ext cx="5945885" cy="523220"/>
+              </a:xfrm>
+              <a:prstGeom prst="rect">
+                <a:avLst/>
+              </a:prstGeom>
+              <a:noFill/>
+            </p:spPr>
+            <p:txBody>
+              <a:bodyPr wrap="square" rtlCol="0">
+                <a:spAutoFit/>
+              </a:bodyPr>
+              <a:lstStyle/>
+              <a:p>
+                <a:r>
+                  <a:rPr lang="en-US" sz="2800" dirty="0"/>
+                  <a:t>Ten key events with highest </a:t>
+                </a:r>
+                <a14:m>
+                  <m:oMath xmlns:m="http://schemas.openxmlformats.org/officeDocument/2006/math">
+                    <m:sSub>
+                      <m:sSubPr>
+                        <m:ctrlPr>
+                          <a:rPr lang="en-US" sz="2800" i="1" smtClean="0">
+                            <a:latin typeface="Cambria Math" panose="02040503050406030204" pitchFamily="18" charset="0"/>
+                          </a:rPr>
+                        </m:ctrlPr>
+                      </m:sSubPr>
+                      <m:e>
+                        <m:r>
+                          <a:rPr lang="en-US" sz="2800" b="0" i="1" smtClean="0">
+                            <a:latin typeface="Cambria Math" panose="02040503050406030204" pitchFamily="18" charset="0"/>
+                          </a:rPr>
+                          <m:t>𝐷</m:t>
+                        </m:r>
+                      </m:e>
+                      <m:sub>
+                        <m:r>
+                          <a:rPr lang="en-US" sz="2800" b="0" i="1" smtClean="0">
+                            <a:latin typeface="Cambria Math" panose="02040503050406030204" pitchFamily="18" charset="0"/>
+                          </a:rPr>
+                          <m:t>𝑎𝑙𝑙</m:t>
+                        </m:r>
+                      </m:sub>
+                    </m:sSub>
+                  </m:oMath>
+                </a14:m>
+                <a:r>
+                  <a:rPr lang="en-US" sz="2800" dirty="0"/>
+                  <a:t> value</a:t>
+                </a:r>
+              </a:p>
+            </p:txBody>
+          </p:sp>
+        </mc:Choice>
+        <mc:Fallback>
+          <p:sp>
+            <p:nvSpPr>
+              <p:cNvPr id="10" name="TextBox 9"/>
+              <p:cNvSpPr txBox="1">
+                <a:spLocks noRot="1" noChangeAspect="1" noMove="1" noResize="1" noEditPoints="1" noAdjustHandles="1" noChangeArrowheads="1" noChangeShapeType="1" noTextEdit="1"/>
+              </p:cNvSpPr>
+              <p:nvPr/>
+            </p:nvSpPr>
+            <p:spPr>
+              <a:xfrm>
+                <a:off x="615695" y="1543199"/>
+                <a:ext cx="5945885" cy="523220"/>
+              </a:xfrm>
+              <a:prstGeom prst="rect">
+                <a:avLst/>
+              </a:prstGeom>
+              <a:blipFill>
+                <a:blip r:embed="rId7"/>
+                <a:stretch>
+                  <a:fillRect l="-2051" t="-10465" b="-32558"/>
+                </a:stretch>
+              </a:blipFill>
+            </p:spPr>
+            <p:txBody>
+              <a:bodyPr/>
+              <a:lstStyle/>
+              <a:p>
+                <a:r>
+                  <a:rPr lang="en-US">
+                    <a:noFill/>
+                  </a:rPr>
+                  <a:t> </a:t>
+                </a:r>
+              </a:p>
+            </p:txBody>
+          </p:sp>
+        </mc:Fallback>
+      </mc:AlternateContent>
+    </p:spTree>
+    <p:extLst>
+      <p:ext uri="{BB962C8B-B14F-4D97-AF65-F5344CB8AC3E}">
+        <p14:creationId xmlns:p14="http://schemas.microsoft.com/office/powerpoint/2010/main" val="1796334907"/>
+      </p:ext>
+    </p:extLst>
+  </p:cSld>
+  <p:clrMapOvr>
+    <a:masterClrMapping/>
+  </p:clrMapOvr>
+</p:sld>
+</file>
+
+<file path=ppt/slides/slide14.xml><?xml version="1.0" encoding="utf-8"?>
 <p:sld xmlns:a="http://schemas.openxmlformats.org/drawingml/2006/main" xmlns:r="http://schemas.openxmlformats.org/officeDocument/2006/relationships" xmlns:p="http://schemas.openxmlformats.org/presentationml/2006/main">
   <p:cSld>
     <p:spTree>
@@ -4717,7 +5839,556 @@
 </p:sld>
 </file>
 
-<file path=ppt/slides/slide13.xml><?xml version="1.0" encoding="utf-8"?>
+<file path=ppt/slides/slide15.xml><?xml version="1.0" encoding="utf-8"?>
+<p:sld xmlns:a="http://schemas.openxmlformats.org/drawingml/2006/main" xmlns:r="http://schemas.openxmlformats.org/officeDocument/2006/relationships" xmlns:p="http://schemas.openxmlformats.org/presentationml/2006/main">
+  <p:cSld>
+    <p:spTree>
+      <p:nvGrpSpPr>
+        <p:cNvPr id="1" name=""/>
+        <p:cNvGrpSpPr/>
+        <p:nvPr/>
+      </p:nvGrpSpPr>
+      <p:grpSpPr>
+        <a:xfrm>
+          <a:off x="0" y="0"/>
+          <a:ext cx="0" cy="0"/>
+          <a:chOff x="0" y="0"/>
+          <a:chExt cx="0" cy="0"/>
+        </a:xfrm>
+      </p:grpSpPr>
+      <p:sp>
+        <p:nvSpPr>
+          <p:cNvPr id="2" name="Title 1"/>
+          <p:cNvSpPr>
+            <a:spLocks noGrp="1"/>
+          </p:cNvSpPr>
+          <p:nvPr>
+            <p:ph type="title"/>
+          </p:nvPr>
+        </p:nvSpPr>
+        <p:spPr>
+          <a:xfrm>
+            <a:off x="583607" y="36783"/>
+            <a:ext cx="3932237" cy="739074"/>
+          </a:xfrm>
+        </p:spPr>
+        <p:txBody>
+          <a:bodyPr>
+            <a:normAutofit/>
+          </a:bodyPr>
+          <a:lstStyle/>
+          <a:p>
+            <a:r>
+              <a:rPr lang="en-US" dirty="0"/>
+              <a:t>Degree (in) </a:t>
+            </a:r>
+            <a:r>
+              <a:rPr lang="en-US" dirty="0" err="1"/>
+              <a:t>Heatmap</a:t>
+            </a:r>
+            <a:endParaRPr lang="en-US" dirty="0"/>
+          </a:p>
+        </p:txBody>
+      </p:sp>
+      <mc:AlternateContent xmlns:mc="http://schemas.openxmlformats.org/markup-compatibility/2006" xmlns:a14="http://schemas.microsoft.com/office/drawing/2010/main">
+        <mc:Choice Requires="a14">
+          <p:sp>
+            <p:nvSpPr>
+              <p:cNvPr id="4" name="Text Placeholder 3"/>
+              <p:cNvSpPr>
+                <a:spLocks noGrp="1"/>
+              </p:cNvSpPr>
+              <p:nvPr>
+                <p:ph type="body" sz="half" idx="2"/>
+              </p:nvPr>
+            </p:nvSpPr>
+            <p:spPr>
+              <a:xfrm>
+                <a:off x="583607" y="775857"/>
+                <a:ext cx="3932237" cy="3811588"/>
+              </a:xfrm>
+            </p:spPr>
+            <p:txBody>
+              <a:bodyPr/>
+              <a:lstStyle/>
+              <a:p>
+                <a:r>
+                  <a:rPr lang="en-US" dirty="0"/>
+                  <a:t>The degree (in), </a:t>
+                </a:r>
+                <a14:m>
+                  <m:oMath xmlns:m="http://schemas.openxmlformats.org/officeDocument/2006/math">
+                    <m:sSub>
+                      <m:sSubPr>
+                        <m:ctrlPr>
+                          <a:rPr lang="en-US" b="0" i="1" smtClean="0">
+                            <a:latin typeface="Cambria Math" panose="02040503050406030204" pitchFamily="18" charset="0"/>
+                          </a:rPr>
+                        </m:ctrlPr>
+                      </m:sSubPr>
+                      <m:e>
+                        <m:r>
+                          <a:rPr lang="en-US" b="0" i="1" smtClean="0">
+                            <a:latin typeface="Cambria Math" panose="02040503050406030204" pitchFamily="18" charset="0"/>
+                          </a:rPr>
+                          <m:t>𝐷</m:t>
+                        </m:r>
+                      </m:e>
+                      <m:sub>
+                        <m:r>
+                          <a:rPr lang="en-US" b="0" i="1" smtClean="0">
+                            <a:latin typeface="Cambria Math" panose="02040503050406030204" pitchFamily="18" charset="0"/>
+                          </a:rPr>
+                          <m:t>𝑖𝑛</m:t>
+                        </m:r>
+                      </m:sub>
+                    </m:sSub>
+                  </m:oMath>
+                </a14:m>
+                <a:r>
+                  <a:rPr lang="en-US" dirty="0"/>
+                  <a:t> of a node is the number of adjacent edges coming into that node. The key event with the highest </a:t>
+                </a:r>
+                <a14:m>
+                  <m:oMath xmlns:m="http://schemas.openxmlformats.org/officeDocument/2006/math">
+                    <m:sSub>
+                      <m:sSubPr>
+                        <m:ctrlPr>
+                          <a:rPr lang="en-US" b="0" i="1" smtClean="0">
+                            <a:latin typeface="Cambria Math" panose="02040503050406030204" pitchFamily="18" charset="0"/>
+                          </a:rPr>
+                        </m:ctrlPr>
+                      </m:sSubPr>
+                      <m:e>
+                        <m:r>
+                          <a:rPr lang="en-US" b="0" i="1" smtClean="0">
+                            <a:latin typeface="Cambria Math" panose="02040503050406030204" pitchFamily="18" charset="0"/>
+                          </a:rPr>
+                          <m:t>𝐷</m:t>
+                        </m:r>
+                      </m:e>
+                      <m:sub>
+                        <m:r>
+                          <a:rPr lang="en-US" b="0" i="1" smtClean="0">
+                            <a:latin typeface="Cambria Math" panose="02040503050406030204" pitchFamily="18" charset="0"/>
+                          </a:rPr>
+                          <m:t>𝑖𝑛</m:t>
+                        </m:r>
+                      </m:sub>
+                    </m:sSub>
+                  </m:oMath>
+                </a14:m>
+                <a:r>
+                  <a:rPr lang="en-US" dirty="0"/>
+                  <a:t> is</a:t>
+                </a:r>
+                <a:r>
+                  <a:rPr lang="en-US" sz="1800" b="1" dirty="0"/>
+                  <a:t> </a:t>
+                </a:r>
+                <a:r>
+                  <a:rPr lang="en-US" sz="1800" b="1" dirty="0">
+                    <a:solidFill>
+                      <a:srgbClr val="FF0000"/>
+                    </a:solidFill>
+                  </a:rPr>
+                  <a:t>Increased mortality</a:t>
+                </a:r>
+                <a:r>
+                  <a:rPr lang="en-US" i="1" dirty="0"/>
+                  <a:t>, </a:t>
+                </a:r>
+                <a:r>
+                  <a:rPr lang="en-US" dirty="0"/>
+                  <a:t>with 13 incident edges.</a:t>
+                </a:r>
+              </a:p>
+            </p:txBody>
+          </p:sp>
+        </mc:Choice>
+        <mc:Fallback xmlns="">
+          <p:sp>
+            <p:nvSpPr>
+              <p:cNvPr id="4" name="Text Placeholder 3"/>
+              <p:cNvSpPr>
+                <a:spLocks noGrp="1" noRot="1" noChangeAspect="1" noMove="1" noResize="1" noEditPoints="1" noAdjustHandles="1" noChangeArrowheads="1" noChangeShapeType="1" noTextEdit="1"/>
+              </p:cNvSpPr>
+              <p:nvPr>
+                <p:ph type="body" sz="half" idx="2"/>
+              </p:nvPr>
+            </p:nvSpPr>
+            <p:spPr>
+              <a:xfrm>
+                <a:off x="583607" y="775857"/>
+                <a:ext cx="3932237" cy="3811588"/>
+              </a:xfrm>
+              <a:blipFill>
+                <a:blip r:embed="rId3"/>
+                <a:stretch>
+                  <a:fillRect l="-1395" t="-1118" r="-1395"/>
+                </a:stretch>
+              </a:blipFill>
+            </p:spPr>
+            <p:txBody>
+              <a:bodyPr/>
+              <a:lstStyle/>
+              <a:p>
+                <a:r>
+                  <a:rPr lang="en-US">
+                    <a:noFill/>
+                  </a:rPr>
+                  <a:t> </a:t>
+                </a:r>
+              </a:p>
+            </p:txBody>
+          </p:sp>
+        </mc:Fallback>
+      </mc:AlternateContent>
+      <p:pic>
+        <p:nvPicPr>
+          <p:cNvPr id="5" name="Picture 4" descr="Screen Clipping"/>
+          <p:cNvPicPr>
+            <a:picLocks noChangeAspect="1"/>
+          </p:cNvPicPr>
+          <p:nvPr/>
+        </p:nvPicPr>
+        <p:blipFill>
+          <a:blip r:embed="rId4">
+            <a:extLst>
+              <a:ext uri="{28A0092B-C50C-407E-A947-70E740481C1C}">
+                <a14:useLocalDpi xmlns:a14="http://schemas.microsoft.com/office/drawing/2010/main" val="0"/>
+              </a:ext>
+            </a:extLst>
+          </a:blip>
+          <a:stretch>
+            <a:fillRect/>
+          </a:stretch>
+        </p:blipFill>
+        <p:spPr>
+          <a:xfrm>
+            <a:off x="274315" y="2084599"/>
+            <a:ext cx="4550819" cy="4603531"/>
+          </a:xfrm>
+          <a:prstGeom prst="rect">
+            <a:avLst/>
+          </a:prstGeom>
+        </p:spPr>
+      </p:pic>
+      <p:sp>
+        <p:nvSpPr>
+          <p:cNvPr id="7" name="Rectangle 6"/>
+          <p:cNvSpPr/>
+          <p:nvPr/>
+        </p:nvSpPr>
+        <p:spPr>
+          <a:xfrm>
+            <a:off x="5134426" y="2084599"/>
+            <a:ext cx="6387014" cy="3139321"/>
+          </a:xfrm>
+          <a:prstGeom prst="rect">
+            <a:avLst/>
+          </a:prstGeom>
+        </p:spPr>
+        <p:txBody>
+          <a:bodyPr wrap="square">
+            <a:spAutoFit/>
+          </a:bodyPr>
+          <a:lstStyle/>
+          <a:p>
+            <a:r>
+              <a:rPr lang="en-US" b="1" dirty="0"/>
+              <a:t>Key Event Name</a:t>
+            </a:r>
+          </a:p>
+          <a:p>
+            <a:r>
+              <a:rPr lang="en-US" dirty="0"/>
+              <a:t>"Increased, Mortality"                                            </a:t>
+            </a:r>
+          </a:p>
+          <a:p>
+            <a:r>
+              <a:rPr lang="en-US" dirty="0"/>
+              <a:t>"Increased, Liver Steatosis"                                      </a:t>
+            </a:r>
+          </a:p>
+          <a:p>
+            <a:r>
+              <a:rPr lang="en-US" dirty="0"/>
+              <a:t>"Increase, Oxidative Stress"                                      </a:t>
+            </a:r>
+          </a:p>
+          <a:p>
+            <a:r>
+              <a:rPr lang="en-US" dirty="0"/>
+              <a:t>"Decreased, Reproductive Success"                                 </a:t>
+            </a:r>
+          </a:p>
+          <a:p>
+            <a:r>
+              <a:rPr lang="en-US" dirty="0"/>
+              <a:t>"Impairment, Learning and memory"                                 </a:t>
+            </a:r>
+          </a:p>
+          <a:p>
+            <a:r>
+              <a:rPr lang="en-US" dirty="0"/>
+              <a:t>"Decreased, Synaptogenesis"                                       </a:t>
+            </a:r>
+          </a:p>
+          <a:p>
+            <a:r>
+              <a:rPr lang="en-US" dirty="0"/>
+              <a:t>"Accumulation, Fatty acid"                                        </a:t>
+            </a:r>
+          </a:p>
+          <a:p>
+            <a:r>
+              <a:rPr lang="en-US" dirty="0"/>
+              <a:t>"Reduction, 17beta-estradiol synthesis by ovarian granulosa cells"</a:t>
+            </a:r>
+          </a:p>
+          <a:p>
+            <a:r>
+              <a:rPr lang="en-US" dirty="0"/>
+              <a:t>"Depletion, energy reserves"                                      </a:t>
+            </a:r>
+          </a:p>
+          <a:p>
+            <a:r>
+              <a:rPr lang="en-US" dirty="0"/>
+              <a:t>"Weakened, Colony" </a:t>
+            </a:r>
+          </a:p>
+        </p:txBody>
+      </p:sp>
+      <mc:AlternateContent xmlns:mc="http://schemas.openxmlformats.org/markup-compatibility/2006">
+        <mc:Choice xmlns:a14="http://schemas.microsoft.com/office/drawing/2010/main" Requires="a14">
+          <p:sp>
+            <p:nvSpPr>
+              <p:cNvPr id="9" name="Rectangle 8"/>
+              <p:cNvSpPr/>
+              <p:nvPr/>
+            </p:nvSpPr>
+            <p:spPr>
+              <a:xfrm>
+                <a:off x="11521440" y="2084599"/>
+                <a:ext cx="466951" cy="3139321"/>
+              </a:xfrm>
+              <a:prstGeom prst="rect">
+                <a:avLst/>
+              </a:prstGeom>
+            </p:spPr>
+            <p:txBody>
+              <a:bodyPr wrap="square">
+                <a:spAutoFit/>
+              </a:bodyPr>
+              <a:lstStyle/>
+              <a:p>
+                <a:pPr algn="ctr"/>
+                <a14:m>
+                  <m:oMathPara xmlns:m="http://schemas.openxmlformats.org/officeDocument/2006/math">
+                    <m:oMathParaPr>
+                      <m:jc m:val="centerGroup"/>
+                    </m:oMathParaPr>
+                    <m:oMath xmlns:m="http://schemas.openxmlformats.org/officeDocument/2006/math">
+                      <m:sSub>
+                        <m:sSubPr>
+                          <m:ctrlPr>
+                            <a:rPr lang="en-US" b="1" i="1" smtClean="0">
+                              <a:latin typeface="Cambria Math" panose="02040503050406030204" pitchFamily="18" charset="0"/>
+                            </a:rPr>
+                          </m:ctrlPr>
+                        </m:sSubPr>
+                        <m:e>
+                          <m:r>
+                            <a:rPr lang="en-US" b="1" i="1" smtClean="0">
+                              <a:latin typeface="Cambria Math" panose="02040503050406030204" pitchFamily="18" charset="0"/>
+                            </a:rPr>
+                            <m:t>𝑫</m:t>
+                          </m:r>
+                        </m:e>
+                        <m:sub>
+                          <m:r>
+                            <a:rPr lang="en-US" b="1" i="1" smtClean="0">
+                              <a:latin typeface="Cambria Math" panose="02040503050406030204" pitchFamily="18" charset="0"/>
+                            </a:rPr>
+                            <m:t>𝒊𝒏</m:t>
+                          </m:r>
+                        </m:sub>
+                      </m:sSub>
+                    </m:oMath>
+                  </m:oMathPara>
+                </a14:m>
+                <a:endParaRPr lang="en-US" b="1" dirty="0"/>
+              </a:p>
+              <a:p>
+                <a:pPr algn="ctr"/>
+                <a:r>
+                  <a:rPr lang="en-US" dirty="0"/>
+                  <a:t>13  9  9  8  8  7  7  7  6  6</a:t>
+                </a:r>
+              </a:p>
+            </p:txBody>
+          </p:sp>
+        </mc:Choice>
+        <mc:Fallback>
+          <p:sp>
+            <p:nvSpPr>
+              <p:cNvPr id="9" name="Rectangle 8"/>
+              <p:cNvSpPr>
+                <a:spLocks noRot="1" noChangeAspect="1" noMove="1" noResize="1" noEditPoints="1" noAdjustHandles="1" noChangeArrowheads="1" noChangeShapeType="1" noTextEdit="1"/>
+              </p:cNvSpPr>
+              <p:nvPr/>
+            </p:nvSpPr>
+            <p:spPr>
+              <a:xfrm>
+                <a:off x="11521440" y="2084599"/>
+                <a:ext cx="466951" cy="3139321"/>
+              </a:xfrm>
+              <a:prstGeom prst="rect">
+                <a:avLst/>
+              </a:prstGeom>
+              <a:blipFill>
+                <a:blip r:embed="rId5"/>
+                <a:stretch>
+                  <a:fillRect l="-18182" r="-14286" b="-2136"/>
+                </a:stretch>
+              </a:blipFill>
+            </p:spPr>
+            <p:txBody>
+              <a:bodyPr/>
+              <a:lstStyle/>
+              <a:p>
+                <a:r>
+                  <a:rPr lang="en-US">
+                    <a:noFill/>
+                  </a:rPr>
+                  <a:t> </a:t>
+                </a:r>
+              </a:p>
+            </p:txBody>
+          </p:sp>
+        </mc:Fallback>
+      </mc:AlternateContent>
+      <mc:AlternateContent xmlns:mc="http://schemas.openxmlformats.org/markup-compatibility/2006">
+        <mc:Choice xmlns:a14="http://schemas.microsoft.com/office/drawing/2010/main" Requires="a14">
+          <p:sp>
+            <p:nvSpPr>
+              <p:cNvPr id="10" name="TextBox 9"/>
+              <p:cNvSpPr txBox="1"/>
+              <p:nvPr/>
+            </p:nvSpPr>
+            <p:spPr>
+              <a:xfrm>
+                <a:off x="5134426" y="1561379"/>
+                <a:ext cx="5945885" cy="523220"/>
+              </a:xfrm>
+              <a:prstGeom prst="rect">
+                <a:avLst/>
+              </a:prstGeom>
+              <a:noFill/>
+            </p:spPr>
+            <p:txBody>
+              <a:bodyPr wrap="square" rtlCol="0">
+                <a:spAutoFit/>
+              </a:bodyPr>
+              <a:lstStyle/>
+              <a:p>
+                <a:r>
+                  <a:rPr lang="en-US" sz="2800" dirty="0"/>
+                  <a:t>Ten key events with highest </a:t>
+                </a:r>
+                <a14:m>
+                  <m:oMath xmlns:m="http://schemas.openxmlformats.org/officeDocument/2006/math">
+                    <m:sSub>
+                      <m:sSubPr>
+                        <m:ctrlPr>
+                          <a:rPr lang="en-US" sz="2800" i="1" smtClean="0">
+                            <a:latin typeface="Cambria Math" panose="02040503050406030204" pitchFamily="18" charset="0"/>
+                          </a:rPr>
+                        </m:ctrlPr>
+                      </m:sSubPr>
+                      <m:e>
+                        <m:r>
+                          <a:rPr lang="en-US" sz="2800" b="0" i="1" smtClean="0">
+                            <a:latin typeface="Cambria Math" panose="02040503050406030204" pitchFamily="18" charset="0"/>
+                          </a:rPr>
+                          <m:t>𝐷</m:t>
+                        </m:r>
+                      </m:e>
+                      <m:sub>
+                        <m:r>
+                          <a:rPr lang="en-US" sz="2800" b="0" i="1" smtClean="0">
+                            <a:latin typeface="Cambria Math" panose="02040503050406030204" pitchFamily="18" charset="0"/>
+                          </a:rPr>
+                          <m:t>𝑖𝑛</m:t>
+                        </m:r>
+                      </m:sub>
+                    </m:sSub>
+                  </m:oMath>
+                </a14:m>
+                <a:r>
+                  <a:rPr lang="en-US" sz="2800" dirty="0"/>
+                  <a:t> value</a:t>
+                </a:r>
+              </a:p>
+            </p:txBody>
+          </p:sp>
+        </mc:Choice>
+        <mc:Fallback>
+          <p:sp>
+            <p:nvSpPr>
+              <p:cNvPr id="10" name="TextBox 9"/>
+              <p:cNvSpPr txBox="1">
+                <a:spLocks noRot="1" noChangeAspect="1" noMove="1" noResize="1" noEditPoints="1" noAdjustHandles="1" noChangeArrowheads="1" noChangeShapeType="1" noTextEdit="1"/>
+              </p:cNvSpPr>
+              <p:nvPr/>
+            </p:nvSpPr>
+            <p:spPr>
+              <a:xfrm>
+                <a:off x="5134426" y="1561379"/>
+                <a:ext cx="5945885" cy="523220"/>
+              </a:xfrm>
+              <a:prstGeom prst="rect">
+                <a:avLst/>
+              </a:prstGeom>
+              <a:blipFill>
+                <a:blip r:embed="rId6"/>
+                <a:stretch>
+                  <a:fillRect l="-2049" t="-10465" b="-32558"/>
+                </a:stretch>
+              </a:blipFill>
+            </p:spPr>
+            <p:txBody>
+              <a:bodyPr/>
+              <a:lstStyle/>
+              <a:p>
+                <a:r>
+                  <a:rPr lang="en-US">
+                    <a:noFill/>
+                  </a:rPr>
+                  <a:t> </a:t>
+                </a:r>
+              </a:p>
+            </p:txBody>
+          </p:sp>
+        </mc:Fallback>
+      </mc:AlternateContent>
+    </p:spTree>
+    <p:extLst>
+      <p:ext uri="{BB962C8B-B14F-4D97-AF65-F5344CB8AC3E}">
+        <p14:creationId xmlns:p14="http://schemas.microsoft.com/office/powerpoint/2010/main" val="4105536449"/>
+      </p:ext>
+    </p:extLst>
+  </p:cSld>
+  <p:clrMapOvr>
+    <a:masterClrMapping/>
+  </p:clrMapOvr>
+</p:sld>
+</file>
+
+<file path=ppt/slides/slide16.xml><?xml version="1.0" encoding="utf-8"?>
 <p:sld xmlns:a="http://schemas.openxmlformats.org/drawingml/2006/main" xmlns:r="http://schemas.openxmlformats.org/officeDocument/2006/relationships" xmlns:p="http://schemas.openxmlformats.org/presentationml/2006/main">
   <p:cSld>
     <p:spTree>
@@ -4991,7 +6662,615 @@
 </p:sld>
 </file>
 
-<file path=ppt/slides/slide14.xml><?xml version="1.0" encoding="utf-8"?>
+<file path=ppt/slides/slide17.xml><?xml version="1.0" encoding="utf-8"?>
+<p:sld xmlns:a="http://schemas.openxmlformats.org/drawingml/2006/main" xmlns:r="http://schemas.openxmlformats.org/officeDocument/2006/relationships" xmlns:p="http://schemas.openxmlformats.org/presentationml/2006/main">
+  <p:cSld>
+    <p:spTree>
+      <p:nvGrpSpPr>
+        <p:cNvPr id="1" name=""/>
+        <p:cNvGrpSpPr/>
+        <p:nvPr/>
+      </p:nvGrpSpPr>
+      <p:grpSpPr>
+        <a:xfrm>
+          <a:off x="0" y="0"/>
+          <a:ext cx="0" cy="0"/>
+          <a:chOff x="0" y="0"/>
+          <a:chExt cx="0" cy="0"/>
+        </a:xfrm>
+      </p:grpSpPr>
+      <p:sp>
+        <p:nvSpPr>
+          <p:cNvPr id="2" name="Title 1"/>
+          <p:cNvSpPr>
+            <a:spLocks noGrp="1"/>
+          </p:cNvSpPr>
+          <p:nvPr>
+            <p:ph type="title"/>
+          </p:nvPr>
+        </p:nvSpPr>
+        <p:spPr>
+          <a:xfrm>
+            <a:off x="7278688" y="37148"/>
+            <a:ext cx="3932237" cy="739074"/>
+          </a:xfrm>
+        </p:spPr>
+        <p:txBody>
+          <a:bodyPr>
+            <a:normAutofit/>
+          </a:bodyPr>
+          <a:lstStyle/>
+          <a:p>
+            <a:r>
+              <a:rPr lang="en-US" dirty="0"/>
+              <a:t>Degree (out) </a:t>
+            </a:r>
+            <a:r>
+              <a:rPr lang="en-US" dirty="0" err="1"/>
+              <a:t>Heatmap</a:t>
+            </a:r>
+            <a:endParaRPr lang="en-US" dirty="0"/>
+          </a:p>
+        </p:txBody>
+      </p:sp>
+      <mc:AlternateContent xmlns:mc="http://schemas.openxmlformats.org/markup-compatibility/2006" xmlns:a14="http://schemas.microsoft.com/office/drawing/2010/main">
+        <mc:Choice Requires="a14">
+          <p:sp>
+            <p:nvSpPr>
+              <p:cNvPr id="4" name="Text Placeholder 3"/>
+              <p:cNvSpPr>
+                <a:spLocks noGrp="1"/>
+              </p:cNvSpPr>
+              <p:nvPr>
+                <p:ph type="body" sz="half" idx="2"/>
+              </p:nvPr>
+            </p:nvSpPr>
+            <p:spPr>
+              <a:xfrm>
+                <a:off x="7278688" y="776222"/>
+                <a:ext cx="3932237" cy="3811588"/>
+              </a:xfrm>
+            </p:spPr>
+            <p:txBody>
+              <a:bodyPr/>
+              <a:lstStyle/>
+              <a:p>
+                <a:r>
+                  <a:rPr lang="en-US" dirty="0"/>
+                  <a:t>The degree (out), </a:t>
+                </a:r>
+                <a14:m>
+                  <m:oMath xmlns:m="http://schemas.openxmlformats.org/officeDocument/2006/math">
+                    <m:sSub>
+                      <m:sSubPr>
+                        <m:ctrlPr>
+                          <a:rPr lang="en-US" b="0" i="1" smtClean="0">
+                            <a:latin typeface="Cambria Math" panose="02040503050406030204" pitchFamily="18" charset="0"/>
+                          </a:rPr>
+                        </m:ctrlPr>
+                      </m:sSubPr>
+                      <m:e>
+                        <m:r>
+                          <a:rPr lang="en-US" b="0" i="1" smtClean="0">
+                            <a:latin typeface="Cambria Math" panose="02040503050406030204" pitchFamily="18" charset="0"/>
+                          </a:rPr>
+                          <m:t>𝐷</m:t>
+                        </m:r>
+                      </m:e>
+                      <m:sub>
+                        <m:r>
+                          <a:rPr lang="en-US" b="0" i="1" smtClean="0">
+                            <a:latin typeface="Cambria Math" panose="02040503050406030204" pitchFamily="18" charset="0"/>
+                          </a:rPr>
+                          <m:t>𝑜𝑢𝑡</m:t>
+                        </m:r>
+                      </m:sub>
+                    </m:sSub>
+                  </m:oMath>
+                </a14:m>
+                <a:r>
+                  <a:rPr lang="en-US" dirty="0"/>
+                  <a:t> of a node is the number of adjacent edges, regardless of directionality.  In this case, the key event with the highest </a:t>
+                </a:r>
+                <a14:m>
+                  <m:oMath xmlns:m="http://schemas.openxmlformats.org/officeDocument/2006/math">
+                    <m:sSub>
+                      <m:sSubPr>
+                        <m:ctrlPr>
+                          <a:rPr lang="en-US" b="0" i="1" smtClean="0">
+                            <a:latin typeface="Cambria Math" panose="02040503050406030204" pitchFamily="18" charset="0"/>
+                          </a:rPr>
+                        </m:ctrlPr>
+                      </m:sSubPr>
+                      <m:e>
+                        <m:r>
+                          <a:rPr lang="en-US" b="0" i="1" smtClean="0">
+                            <a:latin typeface="Cambria Math" panose="02040503050406030204" pitchFamily="18" charset="0"/>
+                          </a:rPr>
+                          <m:t>𝐷</m:t>
+                        </m:r>
+                      </m:e>
+                      <m:sub>
+                        <m:r>
+                          <a:rPr lang="en-US" b="0" i="1" smtClean="0">
+                            <a:latin typeface="Cambria Math" panose="02040503050406030204" pitchFamily="18" charset="0"/>
+                          </a:rPr>
+                          <m:t>𝑜𝑢𝑡</m:t>
+                        </m:r>
+                      </m:sub>
+                    </m:sSub>
+                  </m:oMath>
+                </a14:m>
+                <a:r>
+                  <a:rPr lang="en-US" dirty="0"/>
+                  <a:t> is </a:t>
+                </a:r>
+                <a:r>
+                  <a:rPr lang="en-US" sz="1800" b="1" dirty="0">
+                    <a:solidFill>
+                      <a:srgbClr val="FF0000"/>
+                    </a:solidFill>
+                  </a:rPr>
+                  <a:t>increased oxidative stress</a:t>
+                </a:r>
+                <a:r>
+                  <a:rPr lang="en-US" i="1" dirty="0"/>
+                  <a:t>, </a:t>
+                </a:r>
+                <a:r>
+                  <a:rPr lang="en-US" dirty="0"/>
+                  <a:t>with 13 incident edges.</a:t>
+                </a:r>
+              </a:p>
+            </p:txBody>
+          </p:sp>
+        </mc:Choice>
+        <mc:Fallback xmlns="">
+          <p:sp>
+            <p:nvSpPr>
+              <p:cNvPr id="4" name="Text Placeholder 3"/>
+              <p:cNvSpPr>
+                <a:spLocks noGrp="1" noRot="1" noChangeAspect="1" noMove="1" noResize="1" noEditPoints="1" noAdjustHandles="1" noChangeArrowheads="1" noChangeShapeType="1" noTextEdit="1"/>
+              </p:cNvSpPr>
+              <p:nvPr>
+                <p:ph type="body" sz="half" idx="2"/>
+              </p:nvPr>
+            </p:nvSpPr>
+            <p:spPr>
+              <a:xfrm>
+                <a:off x="7278688" y="776222"/>
+                <a:ext cx="3932237" cy="3811588"/>
+              </a:xfrm>
+              <a:blipFill>
+                <a:blip r:embed="rId2"/>
+                <a:stretch>
+                  <a:fillRect l="-1240" t="-1118" r="-2016"/>
+                </a:stretch>
+              </a:blipFill>
+            </p:spPr>
+            <p:txBody>
+              <a:bodyPr/>
+              <a:lstStyle/>
+              <a:p>
+                <a:r>
+                  <a:rPr lang="en-US">
+                    <a:noFill/>
+                  </a:rPr>
+                  <a:t> </a:t>
+                </a:r>
+              </a:p>
+            </p:txBody>
+          </p:sp>
+        </mc:Fallback>
+      </mc:AlternateContent>
+      <p:pic>
+        <p:nvPicPr>
+          <p:cNvPr id="3" name="Picture 2" descr="Screen Clipping"/>
+          <p:cNvPicPr>
+            <a:picLocks noChangeAspect="1"/>
+          </p:cNvPicPr>
+          <p:nvPr/>
+        </p:nvPicPr>
+        <p:blipFill>
+          <a:blip r:embed="rId3">
+            <a:extLst>
+              <a:ext uri="{28A0092B-C50C-407E-A947-70E740481C1C}">
+                <a14:useLocalDpi xmlns:a14="http://schemas.microsoft.com/office/drawing/2010/main" val="0"/>
+              </a:ext>
+            </a:extLst>
+          </a:blip>
+          <a:stretch>
+            <a:fillRect/>
+          </a:stretch>
+        </p:blipFill>
+        <p:spPr>
+          <a:xfrm>
+            <a:off x="7039787" y="2100111"/>
+            <a:ext cx="4410037" cy="4761386"/>
+          </a:xfrm>
+          <a:prstGeom prst="rect">
+            <a:avLst/>
+          </a:prstGeom>
+        </p:spPr>
+      </p:pic>
+      <mc:AlternateContent xmlns:mc="http://schemas.openxmlformats.org/markup-compatibility/2006">
+        <mc:Choice xmlns:a14="http://schemas.microsoft.com/office/drawing/2010/main" Requires="a14">
+          <p:sp>
+            <p:nvSpPr>
+              <p:cNvPr id="7" name="Rectangle 6"/>
+              <p:cNvSpPr/>
+              <p:nvPr/>
+            </p:nvSpPr>
+            <p:spPr>
+              <a:xfrm>
+                <a:off x="350520" y="1985070"/>
+                <a:ext cx="6096000" cy="3416320"/>
+              </a:xfrm>
+              <a:prstGeom prst="rect">
+                <a:avLst/>
+              </a:prstGeom>
+            </p:spPr>
+            <p:txBody>
+              <a:bodyPr>
+                <a:spAutoFit/>
+              </a:bodyPr>
+              <a:lstStyle/>
+              <a:p>
+                <a:r>
+                  <a:rPr lang="en-US" b="1" dirty="0"/>
+                  <a:t>Key Event Name</a:t>
+                </a:r>
+              </a:p>
+              <a:p>
+                <a:r>
+                  <a:rPr lang="en-US" dirty="0"/>
+                  <a:t>"Increase, Oxidative Stress"                                                          </a:t>
+                </a:r>
+              </a:p>
+              <a:p>
+                <a:r>
+                  <a:rPr lang="en-US" dirty="0"/>
+                  <a:t>"Activation, AHR"                                                                     </a:t>
+                </a:r>
+              </a:p>
+              <a:p>
+                <a:r>
+                  <a:rPr lang="en-US" dirty="0"/>
+                  <a:t>"Activation, PPAR</a:t>
+                </a:r>
+                <a14:m>
+                  <m:oMath xmlns:m="http://schemas.openxmlformats.org/officeDocument/2006/math">
+                    <m:r>
+                      <a:rPr lang="en-US" b="0" i="1" smtClean="0">
+                        <a:latin typeface="Cambria Math" panose="02040503050406030204" pitchFamily="18" charset="0"/>
+                      </a:rPr>
+                      <m:t>𝛼</m:t>
+                    </m:r>
+                  </m:oMath>
+                </a14:m>
+                <a:r>
+                  <a:rPr lang="en-US" dirty="0"/>
+                  <a:t>"                                                                   </a:t>
+                </a:r>
+              </a:p>
+              <a:p>
+                <a:r>
+                  <a:rPr lang="en-US" dirty="0"/>
+                  <a:t>"Activation, LXR"                                                                     </a:t>
+                </a:r>
+              </a:p>
+              <a:p>
+                <a:r>
+                  <a:rPr lang="en-US" dirty="0"/>
+                  <a:t>"N/A, Mitochondrial dysfunction 1"                                                    </a:t>
+                </a:r>
+              </a:p>
+              <a:p>
+                <a:r>
+                  <a:rPr lang="en-US" dirty="0"/>
+                  <a:t>"Increased, serotonin (5-HT)"                                                         </a:t>
+                </a:r>
+              </a:p>
+              <a:p>
+                <a:r>
+                  <a:rPr lang="en-US" dirty="0"/>
+                  <a:t>"Increase, cilia movement"                                                            </a:t>
+                </a:r>
+              </a:p>
+              <a:p>
+                <a:r>
+                  <a:rPr lang="en-US" dirty="0"/>
+                  <a:t>"Inhibition, 5-hydroxytryptamine transporter (5-HTT; SERT)"                           </a:t>
+                </a:r>
+              </a:p>
+              <a:p>
+                <a:r>
+                  <a:rPr lang="en-US" dirty="0"/>
+                  <a:t>"Suppression, Suppression of cytokine production in the presence of T-cell activation"</a:t>
+                </a:r>
+              </a:p>
+              <a:p>
+                <a:r>
+                  <a:rPr lang="en-US" dirty="0"/>
+                  <a:t>"Thyroxine (T4) in serum, Decreased"    </a:t>
+                </a:r>
+              </a:p>
+            </p:txBody>
+          </p:sp>
+        </mc:Choice>
+        <mc:Fallback>
+          <p:sp>
+            <p:nvSpPr>
+              <p:cNvPr id="7" name="Rectangle 6"/>
+              <p:cNvSpPr>
+                <a:spLocks noRot="1" noChangeAspect="1" noMove="1" noResize="1" noEditPoints="1" noAdjustHandles="1" noChangeArrowheads="1" noChangeShapeType="1" noTextEdit="1"/>
+              </p:cNvSpPr>
+              <p:nvPr/>
+            </p:nvSpPr>
+            <p:spPr>
+              <a:xfrm>
+                <a:off x="350520" y="1985070"/>
+                <a:ext cx="6096000" cy="3416320"/>
+              </a:xfrm>
+              <a:prstGeom prst="rect">
+                <a:avLst/>
+              </a:prstGeom>
+              <a:blipFill>
+                <a:blip r:embed="rId4"/>
+                <a:stretch>
+                  <a:fillRect l="-900" t="-1071" r="-18000" b="-1964"/>
+                </a:stretch>
+              </a:blipFill>
+            </p:spPr>
+            <p:txBody>
+              <a:bodyPr/>
+              <a:lstStyle/>
+              <a:p>
+                <a:r>
+                  <a:rPr lang="en-US">
+                    <a:noFill/>
+                  </a:rPr>
+                  <a:t> </a:t>
+                </a:r>
+              </a:p>
+            </p:txBody>
+          </p:sp>
+        </mc:Fallback>
+      </mc:AlternateContent>
+      <mc:AlternateContent xmlns:mc="http://schemas.openxmlformats.org/markup-compatibility/2006">
+        <mc:Choice xmlns:a14="http://schemas.microsoft.com/office/drawing/2010/main" Requires="a14">
+          <p:sp>
+            <p:nvSpPr>
+              <p:cNvPr id="9" name="Rectangle 8"/>
+              <p:cNvSpPr/>
+              <p:nvPr/>
+            </p:nvSpPr>
+            <p:spPr>
+              <a:xfrm>
+                <a:off x="6141678" y="1985070"/>
+                <a:ext cx="424291" cy="3416320"/>
+              </a:xfrm>
+              <a:prstGeom prst="rect">
+                <a:avLst/>
+              </a:prstGeom>
+            </p:spPr>
+            <p:txBody>
+              <a:bodyPr wrap="square">
+                <a:spAutoFit/>
+              </a:bodyPr>
+              <a:lstStyle/>
+              <a:p>
+                <a14:m>
+                  <m:oMathPara xmlns:m="http://schemas.openxmlformats.org/officeDocument/2006/math">
+                    <m:oMathParaPr>
+                      <m:jc m:val="centerGroup"/>
+                    </m:oMathParaPr>
+                    <m:oMath xmlns:m="http://schemas.openxmlformats.org/officeDocument/2006/math">
+                      <m:sSub>
+                        <m:sSubPr>
+                          <m:ctrlPr>
+                            <a:rPr lang="en-US" b="1" i="1" smtClean="0">
+                              <a:latin typeface="Cambria Math" panose="02040503050406030204" pitchFamily="18" charset="0"/>
+                            </a:rPr>
+                          </m:ctrlPr>
+                        </m:sSubPr>
+                        <m:e>
+                          <m:r>
+                            <a:rPr lang="en-US" b="1" i="1" smtClean="0">
+                              <a:latin typeface="Cambria Math" panose="02040503050406030204" pitchFamily="18" charset="0"/>
+                            </a:rPr>
+                            <m:t>𝑫</m:t>
+                          </m:r>
+                        </m:e>
+                        <m:sub>
+                          <m:r>
+                            <a:rPr lang="en-US" b="1" i="1" smtClean="0">
+                              <a:latin typeface="Cambria Math" panose="02040503050406030204" pitchFamily="18" charset="0"/>
+                            </a:rPr>
+                            <m:t>𝒐𝒖𝒕</m:t>
+                          </m:r>
+                        </m:sub>
+                      </m:sSub>
+                    </m:oMath>
+                  </m:oMathPara>
+                </a14:m>
+                <a:endParaRPr lang="en-US" b="1" dirty="0"/>
+              </a:p>
+              <a:p>
+                <a:r>
+                  <a:rPr lang="en-US" dirty="0"/>
+                  <a:t>13 12 11 11  9  8  8  8  7  </a:t>
+                </a:r>
+              </a:p>
+              <a:p>
+                <a:endParaRPr lang="en-US" dirty="0"/>
+              </a:p>
+              <a:p>
+                <a:r>
+                  <a:rPr lang="en-US" dirty="0"/>
+                  <a:t>7</a:t>
+                </a:r>
+              </a:p>
+            </p:txBody>
+          </p:sp>
+        </mc:Choice>
+        <mc:Fallback>
+          <p:sp>
+            <p:nvSpPr>
+              <p:cNvPr id="9" name="Rectangle 8"/>
+              <p:cNvSpPr>
+                <a:spLocks noRot="1" noChangeAspect="1" noMove="1" noResize="1" noEditPoints="1" noAdjustHandles="1" noChangeArrowheads="1" noChangeShapeType="1" noTextEdit="1"/>
+              </p:cNvSpPr>
+              <p:nvPr/>
+            </p:nvSpPr>
+            <p:spPr>
+              <a:xfrm>
+                <a:off x="6141678" y="1985070"/>
+                <a:ext cx="424291" cy="3416320"/>
+              </a:xfrm>
+              <a:prstGeom prst="rect">
+                <a:avLst/>
+              </a:prstGeom>
+              <a:blipFill>
+                <a:blip r:embed="rId5"/>
+                <a:stretch>
+                  <a:fillRect l="-11429" r="-40000" b="-1964"/>
+                </a:stretch>
+              </a:blipFill>
+            </p:spPr>
+            <p:txBody>
+              <a:bodyPr/>
+              <a:lstStyle/>
+              <a:p>
+                <a:r>
+                  <a:rPr lang="en-US">
+                    <a:noFill/>
+                  </a:rPr>
+                  <a:t> </a:t>
+                </a:r>
+              </a:p>
+            </p:txBody>
+          </p:sp>
+        </mc:Fallback>
+      </mc:AlternateContent>
+      <mc:AlternateContent xmlns:mc="http://schemas.openxmlformats.org/markup-compatibility/2006">
+        <mc:Choice xmlns:a14="http://schemas.microsoft.com/office/drawing/2010/main" Requires="a14">
+          <p:sp>
+            <p:nvSpPr>
+              <p:cNvPr id="10" name="TextBox 9"/>
+              <p:cNvSpPr txBox="1"/>
+              <p:nvPr/>
+            </p:nvSpPr>
+            <p:spPr>
+              <a:xfrm>
+                <a:off x="350520" y="1461850"/>
+                <a:ext cx="5945885" cy="523220"/>
+              </a:xfrm>
+              <a:prstGeom prst="rect">
+                <a:avLst/>
+              </a:prstGeom>
+              <a:noFill/>
+            </p:spPr>
+            <p:txBody>
+              <a:bodyPr wrap="square" rtlCol="0">
+                <a:spAutoFit/>
+              </a:bodyPr>
+              <a:lstStyle/>
+              <a:p>
+                <a:r>
+                  <a:rPr lang="en-US" sz="2800" dirty="0"/>
+                  <a:t>Ten key events with highest </a:t>
+                </a:r>
+                <a14:m>
+                  <m:oMath xmlns:m="http://schemas.openxmlformats.org/officeDocument/2006/math">
+                    <m:sSub>
+                      <m:sSubPr>
+                        <m:ctrlPr>
+                          <a:rPr lang="en-US" sz="2800" i="1" smtClean="0">
+                            <a:latin typeface="Cambria Math" panose="02040503050406030204" pitchFamily="18" charset="0"/>
+                          </a:rPr>
+                        </m:ctrlPr>
+                      </m:sSubPr>
+                      <m:e>
+                        <m:r>
+                          <a:rPr lang="en-US" sz="2800" b="0" i="1" smtClean="0">
+                            <a:latin typeface="Cambria Math" panose="02040503050406030204" pitchFamily="18" charset="0"/>
+                          </a:rPr>
+                          <m:t>𝐷</m:t>
+                        </m:r>
+                      </m:e>
+                      <m:sub>
+                        <m:r>
+                          <a:rPr lang="en-US" sz="2800" b="0" i="1" smtClean="0">
+                            <a:latin typeface="Cambria Math" panose="02040503050406030204" pitchFamily="18" charset="0"/>
+                          </a:rPr>
+                          <m:t>𝑜𝑢𝑡</m:t>
+                        </m:r>
+                      </m:sub>
+                    </m:sSub>
+                  </m:oMath>
+                </a14:m>
+                <a:r>
+                  <a:rPr lang="en-US" sz="2800" dirty="0"/>
+                  <a:t> value</a:t>
+                </a:r>
+              </a:p>
+            </p:txBody>
+          </p:sp>
+        </mc:Choice>
+        <mc:Fallback>
+          <p:sp>
+            <p:nvSpPr>
+              <p:cNvPr id="10" name="TextBox 9"/>
+              <p:cNvSpPr txBox="1">
+                <a:spLocks noRot="1" noChangeAspect="1" noMove="1" noResize="1" noEditPoints="1" noAdjustHandles="1" noChangeArrowheads="1" noChangeShapeType="1" noTextEdit="1"/>
+              </p:cNvSpPr>
+              <p:nvPr/>
+            </p:nvSpPr>
+            <p:spPr>
+              <a:xfrm>
+                <a:off x="350520" y="1461850"/>
+                <a:ext cx="5945885" cy="523220"/>
+              </a:xfrm>
+              <a:prstGeom prst="rect">
+                <a:avLst/>
+              </a:prstGeom>
+              <a:blipFill>
+                <a:blip r:embed="rId6"/>
+                <a:stretch>
+                  <a:fillRect l="-2154" t="-11628" b="-32558"/>
+                </a:stretch>
+              </a:blipFill>
+            </p:spPr>
+            <p:txBody>
+              <a:bodyPr/>
+              <a:lstStyle/>
+              <a:p>
+                <a:r>
+                  <a:rPr lang="en-US">
+                    <a:noFill/>
+                  </a:rPr>
+                  <a:t> </a:t>
+                </a:r>
+              </a:p>
+            </p:txBody>
+          </p:sp>
+        </mc:Fallback>
+      </mc:AlternateContent>
+    </p:spTree>
+    <p:extLst>
+      <p:ext uri="{BB962C8B-B14F-4D97-AF65-F5344CB8AC3E}">
+        <p14:creationId xmlns:p14="http://schemas.microsoft.com/office/powerpoint/2010/main" val="892817859"/>
+      </p:ext>
+    </p:extLst>
+  </p:cSld>
+  <p:clrMapOvr>
+    <a:masterClrMapping/>
+  </p:clrMapOvr>
+</p:sld>
+</file>
+
+<file path=ppt/slides/slide18.xml><?xml version="1.0" encoding="utf-8"?>
 <p:sld xmlns:a="http://schemas.openxmlformats.org/drawingml/2006/main" xmlns:r="http://schemas.openxmlformats.org/officeDocument/2006/relationships" xmlns:p="http://schemas.openxmlformats.org/presentationml/2006/main">
   <p:cSld>
     <p:spTree>

</xml_diff>

<commit_message>
Presentation and lobo analysis update
</commit_message>
<xml_diff>
--- a/Presentations/AOPwiki_analysis.pptx
+++ b/Presentations/AOPwiki_analysis.pptx
@@ -5,7 +5,7 @@
     <p:sldMasterId id="2147483684" r:id="rId1"/>
   </p:sldMasterIdLst>
   <p:notesMasterIdLst>
-    <p:notesMasterId r:id="rId20"/>
+    <p:notesMasterId r:id="rId21"/>
   </p:notesMasterIdLst>
   <p:sldIdLst>
     <p:sldId id="256" r:id="rId2"/>
@@ -17,15 +17,16 @@
     <p:sldId id="267" r:id="rId8"/>
     <p:sldId id="265" r:id="rId9"/>
     <p:sldId id="262" r:id="rId10"/>
-    <p:sldId id="273" r:id="rId11"/>
-    <p:sldId id="263" r:id="rId12"/>
-    <p:sldId id="269" r:id="rId13"/>
-    <p:sldId id="274" r:id="rId14"/>
-    <p:sldId id="270" r:id="rId15"/>
-    <p:sldId id="275" r:id="rId16"/>
-    <p:sldId id="271" r:id="rId17"/>
-    <p:sldId id="276" r:id="rId18"/>
-    <p:sldId id="272" r:id="rId19"/>
+    <p:sldId id="277" r:id="rId11"/>
+    <p:sldId id="273" r:id="rId12"/>
+    <p:sldId id="263" r:id="rId13"/>
+    <p:sldId id="269" r:id="rId14"/>
+    <p:sldId id="274" r:id="rId15"/>
+    <p:sldId id="270" r:id="rId16"/>
+    <p:sldId id="275" r:id="rId17"/>
+    <p:sldId id="271" r:id="rId18"/>
+    <p:sldId id="276" r:id="rId19"/>
+    <p:sldId id="272" r:id="rId20"/>
   </p:sldIdLst>
   <p:sldSz cx="12192000" cy="6858000"/>
   <p:notesSz cx="6858000" cy="9144000"/>
@@ -138,6 +139,7 @@
             <p14:sldId id="267"/>
             <p14:sldId id="265"/>
             <p14:sldId id="262"/>
+            <p14:sldId id="277"/>
             <p14:sldId id="273"/>
             <p14:sldId id="263"/>
             <p14:sldId id="269"/>
@@ -252,7 +254,7 @@
           <a:p>
             <a:fld id="{000F2778-583D-47DD-9F96-F6161A447264}" type="datetimeFigureOut">
               <a:rPr lang="en-US" smtClean="0"/>
-              <a:t>6/19/2017</a:t>
+              <a:t>6/26/2017</a:t>
             </a:fld>
             <a:endParaRPr lang="en-US"/>
           </a:p>
@@ -921,7 +923,7 @@
     </p:spTree>
     <p:extLst>
       <p:ext uri="{BB962C8B-B14F-4D97-AF65-F5344CB8AC3E}">
-        <p14:creationId xmlns:p14="http://schemas.microsoft.com/office/powerpoint/2010/main" val="260849188"/>
+        <p14:creationId xmlns:p14="http://schemas.microsoft.com/office/powerpoint/2010/main" val="91829515"/>
       </p:ext>
     </p:extLst>
   </p:cSld>
@@ -977,13 +979,20 @@
           <a:p>
             <a:r>
               <a:rPr lang="en-US" dirty="0"/>
-              <a:t>To do: More specific</a:t>
+              <a:t>To do:</a:t>
             </a:r>
             <a:r>
               <a:rPr lang="en-US" baseline="0" dirty="0"/>
-              <a:t> information based on centrality measures.  Expand to include better information about KEs, maybe show top ten?</a:t>
-            </a:r>
-            <a:endParaRPr lang="en-US" dirty="0"/>
+              <a:t> </a:t>
+            </a:r>
+            <a:r>
+              <a:rPr lang="en-US" dirty="0"/>
+              <a:t>Create layout</a:t>
+            </a:r>
+            <a:r>
+              <a:rPr lang="en-US" baseline="0" dirty="0"/>
+              <a:t> for AOP networks based on level of biological organization. Can we do a similar analysis for MIE and AO?  What about KEs/KERs/AOPs by author?   </a:t>
+            </a:r>
           </a:p>
         </p:txBody>
       </p:sp>
@@ -1004,7 +1013,7 @@
           <a:p>
             <a:fld id="{8C5291EA-D524-4968-939F-FF9188A27C11}" type="slidenum">
               <a:rPr lang="en-US" smtClean="0"/>
-              <a:t>12</a:t>
+              <a:t>11</a:t>
             </a:fld>
             <a:endParaRPr lang="en-US"/>
           </a:p>
@@ -1013,7 +1022,7 @@
     </p:spTree>
     <p:extLst>
       <p:ext uri="{BB962C8B-B14F-4D97-AF65-F5344CB8AC3E}">
-        <p14:creationId xmlns:p14="http://schemas.microsoft.com/office/powerpoint/2010/main" val="4164765406"/>
+        <p14:creationId xmlns:p14="http://schemas.microsoft.com/office/powerpoint/2010/main" val="260849188"/>
       </p:ext>
     </p:extLst>
   </p:cSld>
@@ -1105,7 +1114,7 @@
     </p:spTree>
     <p:extLst>
       <p:ext uri="{BB962C8B-B14F-4D97-AF65-F5344CB8AC3E}">
-        <p14:creationId xmlns:p14="http://schemas.microsoft.com/office/powerpoint/2010/main" val="779683296"/>
+        <p14:creationId xmlns:p14="http://schemas.microsoft.com/office/powerpoint/2010/main" val="4164765406"/>
       </p:ext>
     </p:extLst>
   </p:cSld>
@@ -1161,11 +1170,11 @@
           <a:p>
             <a:r>
               <a:rPr lang="en-US" dirty="0"/>
-              <a:t>To do: Incomplete AOP vs</a:t>
+              <a:t>To do: More specific</a:t>
             </a:r>
             <a:r>
               <a:rPr lang="en-US" baseline="0" dirty="0"/>
-              <a:t> Complete AOP and ability to identify AOs and MIEs.  With proper annotation we can use these analyses to identify complete vs incomplete AOPs.  </a:t>
+              <a:t> information based on centrality measures.  Expand to include better information about KEs, maybe show top ten?</a:t>
             </a:r>
             <a:endParaRPr lang="en-US" dirty="0"/>
           </a:p>
@@ -1197,7 +1206,7 @@
     </p:spTree>
     <p:extLst>
       <p:ext uri="{BB962C8B-B14F-4D97-AF65-F5344CB8AC3E}">
-        <p14:creationId xmlns:p14="http://schemas.microsoft.com/office/powerpoint/2010/main" val="3551145391"/>
+        <p14:creationId xmlns:p14="http://schemas.microsoft.com/office/powerpoint/2010/main" val="779683296"/>
       </p:ext>
     </p:extLst>
   </p:cSld>
@@ -1281,6 +1290,98 @@
             <a:fld id="{8C5291EA-D524-4968-939F-FF9188A27C11}" type="slidenum">
               <a:rPr lang="en-US" smtClean="0"/>
               <a:t>15</a:t>
+            </a:fld>
+            <a:endParaRPr lang="en-US"/>
+          </a:p>
+        </p:txBody>
+      </p:sp>
+    </p:spTree>
+    <p:extLst>
+      <p:ext uri="{BB962C8B-B14F-4D97-AF65-F5344CB8AC3E}">
+        <p14:creationId xmlns:p14="http://schemas.microsoft.com/office/powerpoint/2010/main" val="3551145391"/>
+      </p:ext>
+    </p:extLst>
+  </p:cSld>
+  <p:clrMapOvr>
+    <a:masterClrMapping/>
+  </p:clrMapOvr>
+</p:notes>
+</file>
+
+<file path=ppt/notesSlides/notesSlide9.xml><?xml version="1.0" encoding="utf-8"?>
+<p:notes xmlns:a="http://schemas.openxmlformats.org/drawingml/2006/main" xmlns:r="http://schemas.openxmlformats.org/officeDocument/2006/relationships" xmlns:p="http://schemas.openxmlformats.org/presentationml/2006/main">
+  <p:cSld>
+    <p:spTree>
+      <p:nvGrpSpPr>
+        <p:cNvPr id="1" name=""/>
+        <p:cNvGrpSpPr/>
+        <p:nvPr/>
+      </p:nvGrpSpPr>
+      <p:grpSpPr>
+        <a:xfrm>
+          <a:off x="0" y="0"/>
+          <a:ext cx="0" cy="0"/>
+          <a:chOff x="0" y="0"/>
+          <a:chExt cx="0" cy="0"/>
+        </a:xfrm>
+      </p:grpSpPr>
+      <p:sp>
+        <p:nvSpPr>
+          <p:cNvPr id="2" name="Slide Image Placeholder 1"/>
+          <p:cNvSpPr>
+            <a:spLocks noGrp="1" noRot="1" noChangeAspect="1"/>
+          </p:cNvSpPr>
+          <p:nvPr>
+            <p:ph type="sldImg"/>
+          </p:nvPr>
+        </p:nvSpPr>
+        <p:spPr/>
+      </p:sp>
+      <p:sp>
+        <p:nvSpPr>
+          <p:cNvPr id="3" name="Notes Placeholder 2"/>
+          <p:cNvSpPr>
+            <a:spLocks noGrp="1"/>
+          </p:cNvSpPr>
+          <p:nvPr>
+            <p:ph type="body" idx="1"/>
+          </p:nvPr>
+        </p:nvSpPr>
+        <p:spPr/>
+        <p:txBody>
+          <a:bodyPr/>
+          <a:lstStyle/>
+          <a:p>
+            <a:r>
+              <a:rPr lang="en-US" dirty="0"/>
+              <a:t>To do: Incomplete AOP vs</a:t>
+            </a:r>
+            <a:r>
+              <a:rPr lang="en-US" baseline="0" dirty="0"/>
+              <a:t> Complete AOP and ability to identify AOs and MIEs.  With proper annotation we can use these analyses to identify complete vs incomplete AOPs.  </a:t>
+            </a:r>
+            <a:endParaRPr lang="en-US" dirty="0"/>
+          </a:p>
+        </p:txBody>
+      </p:sp>
+      <p:sp>
+        <p:nvSpPr>
+          <p:cNvPr id="4" name="Slide Number Placeholder 3"/>
+          <p:cNvSpPr>
+            <a:spLocks noGrp="1"/>
+          </p:cNvSpPr>
+          <p:nvPr>
+            <p:ph type="sldNum" sz="quarter" idx="10"/>
+          </p:nvPr>
+        </p:nvSpPr>
+        <p:spPr/>
+        <p:txBody>
+          <a:bodyPr/>
+          <a:lstStyle/>
+          <a:p>
+            <a:fld id="{8C5291EA-D524-4968-939F-FF9188A27C11}" type="slidenum">
+              <a:rPr lang="en-US" smtClean="0"/>
+              <a:t>16</a:t>
             </a:fld>
             <a:endParaRPr lang="en-US"/>
           </a:p>
@@ -1430,7 +1531,7 @@
           <a:p>
             <a:fld id="{C71581C8-DC5B-4BAA-A235-D61CE073C796}" type="datetimeFigureOut">
               <a:rPr lang="en-US" smtClean="0"/>
-              <a:t>6/19/2017</a:t>
+              <a:t>6/26/2017</a:t>
             </a:fld>
             <a:endParaRPr lang="en-US"/>
           </a:p>
@@ -1605,7 +1706,7 @@
           <a:p>
             <a:fld id="{C71581C8-DC5B-4BAA-A235-D61CE073C796}" type="datetimeFigureOut">
               <a:rPr lang="en-US" smtClean="0"/>
-              <a:t>6/19/2017</a:t>
+              <a:t>6/26/2017</a:t>
             </a:fld>
             <a:endParaRPr lang="en-US"/>
           </a:p>
@@ -1785,7 +1886,7 @@
           <a:p>
             <a:fld id="{C71581C8-DC5B-4BAA-A235-D61CE073C796}" type="datetimeFigureOut">
               <a:rPr lang="en-US" smtClean="0"/>
-              <a:t>6/19/2017</a:t>
+              <a:t>6/26/2017</a:t>
             </a:fld>
             <a:endParaRPr lang="en-US"/>
           </a:p>
@@ -1960,7 +2061,7 @@
           <a:p>
             <a:fld id="{C71581C8-DC5B-4BAA-A235-D61CE073C796}" type="datetimeFigureOut">
               <a:rPr lang="en-US" smtClean="0"/>
-              <a:t>6/19/2017</a:t>
+              <a:t>6/26/2017</a:t>
             </a:fld>
             <a:endParaRPr lang="en-US"/>
           </a:p>
@@ -2206,7 +2307,7 @@
           <a:p>
             <a:fld id="{C71581C8-DC5B-4BAA-A235-D61CE073C796}" type="datetimeFigureOut">
               <a:rPr lang="en-US" smtClean="0"/>
-              <a:t>6/19/2017</a:t>
+              <a:t>6/26/2017</a:t>
             </a:fld>
             <a:endParaRPr lang="en-US"/>
           </a:p>
@@ -2443,7 +2544,7 @@
           <a:p>
             <a:fld id="{C71581C8-DC5B-4BAA-A235-D61CE073C796}" type="datetimeFigureOut">
               <a:rPr lang="en-US" smtClean="0"/>
-              <a:t>6/19/2017</a:t>
+              <a:t>6/26/2017</a:t>
             </a:fld>
             <a:endParaRPr lang="en-US"/>
           </a:p>
@@ -2810,7 +2911,7 @@
           <a:p>
             <a:fld id="{C71581C8-DC5B-4BAA-A235-D61CE073C796}" type="datetimeFigureOut">
               <a:rPr lang="en-US" smtClean="0"/>
-              <a:t>6/19/2017</a:t>
+              <a:t>6/26/2017</a:t>
             </a:fld>
             <a:endParaRPr lang="en-US"/>
           </a:p>
@@ -2928,7 +3029,7 @@
           <a:p>
             <a:fld id="{C71581C8-DC5B-4BAA-A235-D61CE073C796}" type="datetimeFigureOut">
               <a:rPr lang="en-US" smtClean="0"/>
-              <a:t>6/19/2017</a:t>
+              <a:t>6/26/2017</a:t>
             </a:fld>
             <a:endParaRPr lang="en-US"/>
           </a:p>
@@ -3023,7 +3124,7 @@
           <a:p>
             <a:fld id="{C71581C8-DC5B-4BAA-A235-D61CE073C796}" type="datetimeFigureOut">
               <a:rPr lang="en-US" smtClean="0"/>
-              <a:t>6/19/2017</a:t>
+              <a:t>6/26/2017</a:t>
             </a:fld>
             <a:endParaRPr lang="en-US"/>
           </a:p>
@@ -3300,7 +3401,7 @@
           <a:p>
             <a:fld id="{C71581C8-DC5B-4BAA-A235-D61CE073C796}" type="datetimeFigureOut">
               <a:rPr lang="en-US" smtClean="0"/>
-              <a:t>6/19/2017</a:t>
+              <a:t>6/26/2017</a:t>
             </a:fld>
             <a:endParaRPr lang="en-US"/>
           </a:p>
@@ -3557,7 +3658,7 @@
           <a:p>
             <a:fld id="{C71581C8-DC5B-4BAA-A235-D61CE073C796}" type="datetimeFigureOut">
               <a:rPr lang="en-US" smtClean="0"/>
-              <a:t>6/19/2017</a:t>
+              <a:t>6/26/2017</a:t>
             </a:fld>
             <a:endParaRPr lang="en-US"/>
           </a:p>
@@ -3770,7 +3871,7 @@
           <a:p>
             <a:fld id="{C71581C8-DC5B-4BAA-A235-D61CE073C796}" type="datetimeFigureOut">
               <a:rPr lang="en-US" smtClean="0"/>
-              <a:t>6/19/2017</a:t>
+              <a:t>6/26/2017</a:t>
             </a:fld>
             <a:endParaRPr lang="en-US"/>
           </a:p>
@@ -4408,6 +4509,287 @@
       </p:pic>
       <p:pic>
         <p:nvPicPr>
+          <p:cNvPr id="3" name="Picture 2" descr="Screen Clipping"/>
+          <p:cNvPicPr>
+            <a:picLocks noChangeAspect="1"/>
+          </p:cNvPicPr>
+          <p:nvPr/>
+        </p:nvPicPr>
+        <p:blipFill>
+          <a:blip r:embed="rId5">
+            <a:extLst>
+              <a:ext uri="{28A0092B-C50C-407E-A947-70E740481C1C}">
+                <a14:useLocalDpi xmlns:a14="http://schemas.microsoft.com/office/drawing/2010/main" val="0"/>
+              </a:ext>
+            </a:extLst>
+          </a:blip>
+          <a:stretch>
+            <a:fillRect/>
+          </a:stretch>
+        </p:blipFill>
+        <p:spPr>
+          <a:xfrm>
+            <a:off x="7336342" y="2821113"/>
+            <a:ext cx="4280761" cy="4036887"/>
+          </a:xfrm>
+          <a:prstGeom prst="rect">
+            <a:avLst/>
+          </a:prstGeom>
+        </p:spPr>
+      </p:pic>
+      <p:pic>
+        <p:nvPicPr>
+          <p:cNvPr id="8" name="Picture 7" descr="Screen Clipping"/>
+          <p:cNvPicPr>
+            <a:picLocks noChangeAspect="1"/>
+          </p:cNvPicPr>
+          <p:nvPr/>
+        </p:nvPicPr>
+        <p:blipFill>
+          <a:blip r:embed="rId6">
+            <a:extLst>
+              <a:ext uri="{28A0092B-C50C-407E-A947-70E740481C1C}">
+                <a14:useLocalDpi xmlns:a14="http://schemas.microsoft.com/office/drawing/2010/main" val="0"/>
+              </a:ext>
+            </a:extLst>
+          </a:blip>
+          <a:stretch>
+            <a:fillRect/>
+          </a:stretch>
+        </p:blipFill>
+        <p:spPr>
+          <a:xfrm>
+            <a:off x="9334946" y="2824842"/>
+            <a:ext cx="1745376" cy="1756784"/>
+          </a:xfrm>
+          <a:prstGeom prst="rect">
+            <a:avLst/>
+          </a:prstGeom>
+        </p:spPr>
+      </p:pic>
+      <p:sp>
+        <p:nvSpPr>
+          <p:cNvPr id="5" name="Left-Right Arrow 4"/>
+          <p:cNvSpPr/>
+          <p:nvPr/>
+        </p:nvSpPr>
+        <p:spPr>
+          <a:xfrm rot="1177462">
+            <a:off x="6468108" y="4527540"/>
+            <a:ext cx="924112" cy="474693"/>
+          </a:xfrm>
+          <a:prstGeom prst="leftRightArrow">
+            <a:avLst/>
+          </a:prstGeom>
+          <a:solidFill>
+            <a:schemeClr val="tx1"/>
+          </a:solidFill>
+          <a:ln>
+            <a:solidFill>
+              <a:schemeClr val="bg1">
+                <a:lumMod val="95000"/>
+                <a:lumOff val="5000"/>
+              </a:schemeClr>
+            </a:solidFill>
+          </a:ln>
+        </p:spPr>
+        <p:style>
+          <a:lnRef idx="2">
+            <a:schemeClr val="accent1">
+              <a:shade val="50000"/>
+            </a:schemeClr>
+          </a:lnRef>
+          <a:fillRef idx="1">
+            <a:schemeClr val="accent1"/>
+          </a:fillRef>
+          <a:effectRef idx="0">
+            <a:schemeClr val="accent1"/>
+          </a:effectRef>
+          <a:fontRef idx="minor">
+            <a:schemeClr val="lt1"/>
+          </a:fontRef>
+        </p:style>
+        <p:txBody>
+          <a:bodyPr rtlCol="0" anchor="ctr"/>
+          <a:lstStyle/>
+          <a:p>
+            <a:pPr algn="ctr"/>
+            <a:endParaRPr lang="en-US"/>
+          </a:p>
+        </p:txBody>
+      </p:sp>
+    </p:spTree>
+    <p:extLst>
+      <p:ext uri="{BB962C8B-B14F-4D97-AF65-F5344CB8AC3E}">
+        <p14:creationId xmlns:p14="http://schemas.microsoft.com/office/powerpoint/2010/main" val="3499129688"/>
+      </p:ext>
+    </p:extLst>
+  </p:cSld>
+  <p:clrMapOvr>
+    <a:masterClrMapping/>
+  </p:clrMapOvr>
+</p:sld>
+</file>
+
+<file path=ppt/slides/slide11.xml><?xml version="1.0" encoding="utf-8"?>
+<p:sld xmlns:a="http://schemas.openxmlformats.org/drawingml/2006/main" xmlns:r="http://schemas.openxmlformats.org/officeDocument/2006/relationships" xmlns:p="http://schemas.openxmlformats.org/presentationml/2006/main">
+  <p:cSld>
+    <p:spTree>
+      <p:nvGrpSpPr>
+        <p:cNvPr id="1" name=""/>
+        <p:cNvGrpSpPr/>
+        <p:nvPr/>
+      </p:nvGrpSpPr>
+      <p:grpSpPr>
+        <a:xfrm>
+          <a:off x="0" y="0"/>
+          <a:ext cx="0" cy="0"/>
+          <a:chOff x="0" y="0"/>
+          <a:chExt cx="0" cy="0"/>
+        </a:xfrm>
+      </p:grpSpPr>
+      <p:sp>
+        <p:nvSpPr>
+          <p:cNvPr id="2" name="Title 1"/>
+          <p:cNvSpPr>
+            <a:spLocks noGrp="1"/>
+          </p:cNvSpPr>
+          <p:nvPr>
+            <p:ph type="title"/>
+          </p:nvPr>
+        </p:nvSpPr>
+        <p:spPr>
+          <a:xfrm>
+            <a:off x="7278688" y="827501"/>
+            <a:ext cx="3932237" cy="739074"/>
+          </a:xfrm>
+        </p:spPr>
+        <p:txBody>
+          <a:bodyPr>
+            <a:normAutofit fontScale="90000"/>
+          </a:bodyPr>
+          <a:lstStyle/>
+          <a:p>
+            <a:r>
+              <a:rPr lang="en-US" dirty="0"/>
+              <a:t>Levels of Biological Organization in the </a:t>
+            </a:r>
+            <a:r>
+              <a:rPr lang="en-US" dirty="0" err="1"/>
+              <a:t>AOPwiki</a:t>
+            </a:r>
+            <a:r>
+              <a:rPr lang="en-US" dirty="0"/>
+              <a:t> network</a:t>
+            </a:r>
+          </a:p>
+        </p:txBody>
+      </p:sp>
+      <p:sp>
+        <p:nvSpPr>
+          <p:cNvPr id="4" name="Text Placeholder 3"/>
+          <p:cNvSpPr>
+            <a:spLocks noGrp="1"/>
+          </p:cNvSpPr>
+          <p:nvPr>
+            <p:ph type="body" sz="half" idx="2"/>
+          </p:nvPr>
+        </p:nvSpPr>
+        <p:spPr>
+          <a:xfrm>
+            <a:off x="7278688" y="1566575"/>
+            <a:ext cx="3932237" cy="3811588"/>
+          </a:xfrm>
+        </p:spPr>
+        <p:txBody>
+          <a:bodyPr/>
+          <a:lstStyle/>
+          <a:p>
+            <a:r>
+              <a:rPr lang="en-US" dirty="0"/>
+              <a:t>Colors represent levels of biological organization associated to Key Events in the </a:t>
+            </a:r>
+            <a:r>
+              <a:rPr lang="en-US" dirty="0" err="1"/>
+              <a:t>AOPwiki</a:t>
+            </a:r>
+            <a:r>
+              <a:rPr lang="en-US" dirty="0"/>
+              <a:t>. A total of 750 unique key events are in the wiki, 53 Key events in the </a:t>
+            </a:r>
+            <a:r>
+              <a:rPr lang="en-US" dirty="0" err="1"/>
+              <a:t>AOPwiki</a:t>
+            </a:r>
+            <a:r>
+              <a:rPr lang="en-US" dirty="0"/>
+              <a:t> had unspecified levels of biological organization</a:t>
+            </a:r>
+          </a:p>
+        </p:txBody>
+      </p:sp>
+      <p:pic>
+        <p:nvPicPr>
+          <p:cNvPr id="21" name="Picture 20" descr="Screen Clipping"/>
+          <p:cNvPicPr>
+            <a:picLocks noChangeAspect="1"/>
+          </p:cNvPicPr>
+          <p:nvPr/>
+        </p:nvPicPr>
+        <p:blipFill>
+          <a:blip r:embed="rId3">
+            <a:extLst>
+              <a:ext uri="{28A0092B-C50C-407E-A947-70E740481C1C}">
+                <a14:useLocalDpi xmlns:a14="http://schemas.microsoft.com/office/drawing/2010/main" val="0"/>
+              </a:ext>
+            </a:extLst>
+          </a:blip>
+          <a:stretch>
+            <a:fillRect/>
+          </a:stretch>
+        </p:blipFill>
+        <p:spPr>
+          <a:xfrm>
+            <a:off x="0" y="61373"/>
+            <a:ext cx="6834368" cy="6643560"/>
+          </a:xfrm>
+          <a:prstGeom prst="rect">
+            <a:avLst/>
+          </a:prstGeom>
+        </p:spPr>
+      </p:pic>
+      <p:pic>
+        <p:nvPicPr>
+          <p:cNvPr id="26" name="Picture 25" descr="Screen Clipping"/>
+          <p:cNvPicPr>
+            <a:picLocks noChangeAspect="1"/>
+          </p:cNvPicPr>
+          <p:nvPr/>
+        </p:nvPicPr>
+        <p:blipFill>
+          <a:blip r:embed="rId4">
+            <a:extLst>
+              <a:ext uri="{28A0092B-C50C-407E-A947-70E740481C1C}">
+                <a14:useLocalDpi xmlns:a14="http://schemas.microsoft.com/office/drawing/2010/main" val="0"/>
+              </a:ext>
+            </a:extLst>
+          </a:blip>
+          <a:stretch>
+            <a:fillRect/>
+          </a:stretch>
+        </p:blipFill>
+        <p:spPr>
+          <a:xfrm>
+            <a:off x="7336342" y="2824842"/>
+            <a:ext cx="2960192" cy="3880091"/>
+          </a:xfrm>
+          <a:prstGeom prst="rect">
+            <a:avLst/>
+          </a:prstGeom>
+        </p:spPr>
+      </p:pic>
+      <p:pic>
+        <p:nvPicPr>
           <p:cNvPr id="23" name="Picture 22" descr="Screen Clipping"/>
           <p:cNvPicPr>
             <a:picLocks noChangeAspect="1"/>
@@ -4479,7 +4861,7 @@
 </p:sld>
 </file>
 
-<file path=ppt/slides/slide11.xml><?xml version="1.0" encoding="utf-8"?>
+<file path=ppt/slides/slide12.xml><?xml version="1.0" encoding="utf-8"?>
 <p:sld xmlns:a="http://schemas.openxmlformats.org/drawingml/2006/main" xmlns:r="http://schemas.openxmlformats.org/officeDocument/2006/relationships" xmlns:p="http://schemas.openxmlformats.org/presentationml/2006/main">
   <p:cSld>
     <p:spTree>
@@ -4686,7 +5068,7 @@
 </p:sld>
 </file>
 
-<file path=ppt/slides/slide12.xml><?xml version="1.0" encoding="utf-8"?>
+<file path=ppt/slides/slide13.xml><?xml version="1.0" encoding="utf-8"?>
 <p:sld xmlns:a="http://schemas.openxmlformats.org/drawingml/2006/main" xmlns:r="http://schemas.openxmlformats.org/officeDocument/2006/relationships" xmlns:p="http://schemas.openxmlformats.org/presentationml/2006/main">
   <p:cSld>
     <p:spTree>
@@ -4960,7 +5342,7 @@
 </p:sld>
 </file>
 
-<file path=ppt/slides/slide13.xml><?xml version="1.0" encoding="utf-8"?>
+<file path=ppt/slides/slide14.xml><?xml version="1.0" encoding="utf-8"?>
 <p:sld xmlns:a="http://schemas.openxmlformats.org/drawingml/2006/main" xmlns:r="http://schemas.openxmlformats.org/officeDocument/2006/relationships" xmlns:p="http://schemas.openxmlformats.org/presentationml/2006/main">
   <p:cSld>
     <p:spTree>
@@ -5191,8 +5573,8 @@
           </a:prstGeom>
         </p:spPr>
       </p:pic>
-      <mc:AlternateContent xmlns:mc="http://schemas.openxmlformats.org/markup-compatibility/2006">
-        <mc:Choice xmlns:a14="http://schemas.microsoft.com/office/drawing/2010/main" Requires="a14">
+      <mc:AlternateContent xmlns:mc="http://schemas.openxmlformats.org/markup-compatibility/2006" xmlns:a14="http://schemas.microsoft.com/office/drawing/2010/main">
+        <mc:Choice Requires="a14">
           <p:sp>
             <p:nvSpPr>
               <p:cNvPr id="5" name="Rectangle 4"/>
@@ -5296,7 +5678,7 @@
             </p:txBody>
           </p:sp>
         </mc:Choice>
-        <mc:Fallback>
+        <mc:Fallback xmlns="">
           <p:sp>
             <p:nvSpPr>
               <p:cNvPr id="5" name="Rectangle 4"/>
@@ -5335,8 +5717,8 @@
           </p:sp>
         </mc:Fallback>
       </mc:AlternateContent>
-      <mc:AlternateContent xmlns:mc="http://schemas.openxmlformats.org/markup-compatibility/2006">
-        <mc:Choice xmlns:a14="http://schemas.microsoft.com/office/drawing/2010/main" Requires="a14">
+      <mc:AlternateContent xmlns:mc="http://schemas.openxmlformats.org/markup-compatibility/2006" xmlns:a14="http://schemas.microsoft.com/office/drawing/2010/main">
+        <mc:Choice Requires="a14">
           <p:sp>
             <p:nvSpPr>
               <p:cNvPr id="7" name="Rectangle 6"/>
@@ -5405,7 +5787,7 @@
             </p:txBody>
           </p:sp>
         </mc:Choice>
-        <mc:Fallback>
+        <mc:Fallback xmlns="">
           <p:sp>
             <p:nvSpPr>
               <p:cNvPr id="7" name="Rectangle 6"/>
@@ -5444,8 +5826,8 @@
           </p:sp>
         </mc:Fallback>
       </mc:AlternateContent>
-      <mc:AlternateContent xmlns:mc="http://schemas.openxmlformats.org/markup-compatibility/2006">
-        <mc:Choice xmlns:a14="http://schemas.microsoft.com/office/drawing/2010/main" Requires="a14">
+      <mc:AlternateContent xmlns:mc="http://schemas.openxmlformats.org/markup-compatibility/2006" xmlns:a14="http://schemas.microsoft.com/office/drawing/2010/main">
+        <mc:Choice Requires="a14">
           <p:sp>
             <p:nvSpPr>
               <p:cNvPr id="10" name="TextBox 9"/>
@@ -5509,7 +5891,7 @@
             </p:txBody>
           </p:sp>
         </mc:Choice>
-        <mc:Fallback>
+        <mc:Fallback xmlns="">
           <p:sp>
             <p:nvSpPr>
               <p:cNvPr id="10" name="TextBox 9"/>
@@ -5561,7 +5943,7 @@
 </p:sld>
 </file>
 
-<file path=ppt/slides/slide14.xml><?xml version="1.0" encoding="utf-8"?>
+<file path=ppt/slides/slide15.xml><?xml version="1.0" encoding="utf-8"?>
 <p:sld xmlns:a="http://schemas.openxmlformats.org/drawingml/2006/main" xmlns:r="http://schemas.openxmlformats.org/officeDocument/2006/relationships" xmlns:p="http://schemas.openxmlformats.org/presentationml/2006/main">
   <p:cSld>
     <p:spTree>
@@ -5839,7 +6221,7 @@
 </p:sld>
 </file>
 
-<file path=ppt/slides/slide15.xml><?xml version="1.0" encoding="utf-8"?>
+<file path=ppt/slides/slide16.xml><?xml version="1.0" encoding="utf-8"?>
 <p:sld xmlns:a="http://schemas.openxmlformats.org/drawingml/2006/main" xmlns:r="http://schemas.openxmlformats.org/officeDocument/2006/relationships" xmlns:p="http://schemas.openxmlformats.org/presentationml/2006/main">
   <p:cSld>
     <p:spTree>
@@ -6162,8 +6544,8 @@
           </a:p>
         </p:txBody>
       </p:sp>
-      <mc:AlternateContent xmlns:mc="http://schemas.openxmlformats.org/markup-compatibility/2006">
-        <mc:Choice xmlns:a14="http://schemas.microsoft.com/office/drawing/2010/main" Requires="a14">
+      <mc:AlternateContent xmlns:mc="http://schemas.openxmlformats.org/markup-compatibility/2006" xmlns:a14="http://schemas.microsoft.com/office/drawing/2010/main">
+        <mc:Choice Requires="a14">
           <p:sp>
             <p:nvSpPr>
               <p:cNvPr id="9" name="Rectangle 8"/>
@@ -6232,7 +6614,7 @@
             </p:txBody>
           </p:sp>
         </mc:Choice>
-        <mc:Fallback>
+        <mc:Fallback xmlns="">
           <p:sp>
             <p:nvSpPr>
               <p:cNvPr id="9" name="Rectangle 8"/>
@@ -6271,8 +6653,8 @@
           </p:sp>
         </mc:Fallback>
       </mc:AlternateContent>
-      <mc:AlternateContent xmlns:mc="http://schemas.openxmlformats.org/markup-compatibility/2006">
-        <mc:Choice xmlns:a14="http://schemas.microsoft.com/office/drawing/2010/main" Requires="a14">
+      <mc:AlternateContent xmlns:mc="http://schemas.openxmlformats.org/markup-compatibility/2006" xmlns:a14="http://schemas.microsoft.com/office/drawing/2010/main">
+        <mc:Choice Requires="a14">
           <p:sp>
             <p:nvSpPr>
               <p:cNvPr id="10" name="TextBox 9"/>
@@ -6336,7 +6718,7 @@
             </p:txBody>
           </p:sp>
         </mc:Choice>
-        <mc:Fallback>
+        <mc:Fallback xmlns="">
           <p:sp>
             <p:nvSpPr>
               <p:cNvPr id="10" name="TextBox 9"/>
@@ -6388,7 +6770,7 @@
 </p:sld>
 </file>
 
-<file path=ppt/slides/slide16.xml><?xml version="1.0" encoding="utf-8"?>
+<file path=ppt/slides/slide17.xml><?xml version="1.0" encoding="utf-8"?>
 <p:sld xmlns:a="http://schemas.openxmlformats.org/drawingml/2006/main" xmlns:r="http://schemas.openxmlformats.org/officeDocument/2006/relationships" xmlns:p="http://schemas.openxmlformats.org/presentationml/2006/main">
   <p:cSld>
     <p:spTree>
@@ -6662,7 +7044,7 @@
 </p:sld>
 </file>
 
-<file path=ppt/slides/slide17.xml><?xml version="1.0" encoding="utf-8"?>
+<file path=ppt/slides/slide18.xml><?xml version="1.0" encoding="utf-8"?>
 <p:sld xmlns:a="http://schemas.openxmlformats.org/drawingml/2006/main" xmlns:r="http://schemas.openxmlformats.org/officeDocument/2006/relationships" xmlns:p="http://schemas.openxmlformats.org/presentationml/2006/main">
   <p:cSld>
     <p:spTree>
@@ -6893,8 +7275,8 @@
           </a:prstGeom>
         </p:spPr>
       </p:pic>
-      <mc:AlternateContent xmlns:mc="http://schemas.openxmlformats.org/markup-compatibility/2006">
-        <mc:Choice xmlns:a14="http://schemas.microsoft.com/office/drawing/2010/main" Requires="a14">
+      <mc:AlternateContent xmlns:mc="http://schemas.openxmlformats.org/markup-compatibility/2006" xmlns:a14="http://schemas.microsoft.com/office/drawing/2010/main">
+        <mc:Choice Requires="a14">
           <p:sp>
             <p:nvSpPr>
               <p:cNvPr id="7" name="Rectangle 6"/>
@@ -6998,7 +7380,7 @@
             </p:txBody>
           </p:sp>
         </mc:Choice>
-        <mc:Fallback>
+        <mc:Fallback xmlns="">
           <p:sp>
             <p:nvSpPr>
               <p:cNvPr id="7" name="Rectangle 6"/>
@@ -7037,8 +7419,8 @@
           </p:sp>
         </mc:Fallback>
       </mc:AlternateContent>
-      <mc:AlternateContent xmlns:mc="http://schemas.openxmlformats.org/markup-compatibility/2006">
-        <mc:Choice xmlns:a14="http://schemas.microsoft.com/office/drawing/2010/main" Requires="a14">
+      <mc:AlternateContent xmlns:mc="http://schemas.openxmlformats.org/markup-compatibility/2006" xmlns:a14="http://schemas.microsoft.com/office/drawing/2010/main">
+        <mc:Choice Requires="a14">
           <p:sp>
             <p:nvSpPr>
               <p:cNvPr id="9" name="Rectangle 8"/>
@@ -7060,6 +7442,7 @@
               </a:bodyPr>
               <a:lstStyle/>
               <a:p>
+                <a:pPr/>
                 <a14:m>
                   <m:oMathPara xmlns:m="http://schemas.openxmlformats.org/officeDocument/2006/math">
                     <m:oMathParaPr>
@@ -7114,7 +7497,7 @@
             </p:txBody>
           </p:sp>
         </mc:Choice>
-        <mc:Fallback>
+        <mc:Fallback xmlns="">
           <p:sp>
             <p:nvSpPr>
               <p:cNvPr id="9" name="Rectangle 8"/>
@@ -7153,8 +7536,8 @@
           </p:sp>
         </mc:Fallback>
       </mc:AlternateContent>
-      <mc:AlternateContent xmlns:mc="http://schemas.openxmlformats.org/markup-compatibility/2006">
-        <mc:Choice xmlns:a14="http://schemas.microsoft.com/office/drawing/2010/main" Requires="a14">
+      <mc:AlternateContent xmlns:mc="http://schemas.openxmlformats.org/markup-compatibility/2006" xmlns:a14="http://schemas.microsoft.com/office/drawing/2010/main">
+        <mc:Choice Requires="a14">
           <p:sp>
             <p:nvSpPr>
               <p:cNvPr id="10" name="TextBox 9"/>
@@ -7218,7 +7601,7 @@
             </p:txBody>
           </p:sp>
         </mc:Choice>
-        <mc:Fallback>
+        <mc:Fallback xmlns="">
           <p:sp>
             <p:nvSpPr>
               <p:cNvPr id="10" name="TextBox 9"/>
@@ -7270,7 +7653,7 @@
 </p:sld>
 </file>
 
-<file path=ppt/slides/slide18.xml><?xml version="1.0" encoding="utf-8"?>
+<file path=ppt/slides/slide19.xml><?xml version="1.0" encoding="utf-8"?>
 <p:sld xmlns:a="http://schemas.openxmlformats.org/drawingml/2006/main" xmlns:r="http://schemas.openxmlformats.org/officeDocument/2006/relationships" xmlns:p="http://schemas.openxmlformats.org/presentationml/2006/main">
   <p:cSld>
     <p:spTree>

</xml_diff>

<commit_message>
Update AOP_wiki_analysis.R and added a white bg file..
Should work on white BG file and merge back into a single version.
</commit_message>
<xml_diff>
--- a/Presentations/AOPwiki_analysis.pptx
+++ b/Presentations/AOPwiki_analysis.pptx
@@ -5,7 +5,7 @@
     <p:sldMasterId id="2147483684" r:id="rId1"/>
   </p:sldMasterIdLst>
   <p:notesMasterIdLst>
-    <p:notesMasterId r:id="rId21"/>
+    <p:notesMasterId r:id="rId22"/>
   </p:notesMasterIdLst>
   <p:sldIdLst>
     <p:sldId id="256" r:id="rId2"/>
@@ -27,6 +27,7 @@
     <p:sldId id="271" r:id="rId18"/>
     <p:sldId id="276" r:id="rId19"/>
     <p:sldId id="272" r:id="rId20"/>
+    <p:sldId id="278" r:id="rId21"/>
   </p:sldIdLst>
   <p:sldSz cx="12192000" cy="6858000"/>
   <p:notesSz cx="6858000" cy="9144000"/>
@@ -149,6 +150,7 @@
             <p14:sldId id="271"/>
             <p14:sldId id="276"/>
             <p14:sldId id="272"/>
+            <p14:sldId id="278"/>
           </p14:sldIdLst>
         </p14:section>
       </p14:sectionLst>
@@ -254,7 +256,7 @@
           <a:p>
             <a:fld id="{000F2778-583D-47DD-9F96-F6161A447264}" type="datetimeFigureOut">
               <a:rPr lang="en-US" smtClean="0"/>
-              <a:t>6/26/2017</a:t>
+              <a:t>7/6/2017</a:t>
             </a:fld>
             <a:endParaRPr lang="en-US"/>
           </a:p>
@@ -1531,7 +1533,7 @@
           <a:p>
             <a:fld id="{C71581C8-DC5B-4BAA-A235-D61CE073C796}" type="datetimeFigureOut">
               <a:rPr lang="en-US" smtClean="0"/>
-              <a:t>6/26/2017</a:t>
+              <a:t>7/6/2017</a:t>
             </a:fld>
             <a:endParaRPr lang="en-US"/>
           </a:p>
@@ -1706,7 +1708,7 @@
           <a:p>
             <a:fld id="{C71581C8-DC5B-4BAA-A235-D61CE073C796}" type="datetimeFigureOut">
               <a:rPr lang="en-US" smtClean="0"/>
-              <a:t>6/26/2017</a:t>
+              <a:t>7/6/2017</a:t>
             </a:fld>
             <a:endParaRPr lang="en-US"/>
           </a:p>
@@ -1886,7 +1888,7 @@
           <a:p>
             <a:fld id="{C71581C8-DC5B-4BAA-A235-D61CE073C796}" type="datetimeFigureOut">
               <a:rPr lang="en-US" smtClean="0"/>
-              <a:t>6/26/2017</a:t>
+              <a:t>7/6/2017</a:t>
             </a:fld>
             <a:endParaRPr lang="en-US"/>
           </a:p>
@@ -2061,7 +2063,7 @@
           <a:p>
             <a:fld id="{C71581C8-DC5B-4BAA-A235-D61CE073C796}" type="datetimeFigureOut">
               <a:rPr lang="en-US" smtClean="0"/>
-              <a:t>6/26/2017</a:t>
+              <a:t>7/6/2017</a:t>
             </a:fld>
             <a:endParaRPr lang="en-US"/>
           </a:p>
@@ -2307,7 +2309,7 @@
           <a:p>
             <a:fld id="{C71581C8-DC5B-4BAA-A235-D61CE073C796}" type="datetimeFigureOut">
               <a:rPr lang="en-US" smtClean="0"/>
-              <a:t>6/26/2017</a:t>
+              <a:t>7/6/2017</a:t>
             </a:fld>
             <a:endParaRPr lang="en-US"/>
           </a:p>
@@ -2544,7 +2546,7 @@
           <a:p>
             <a:fld id="{C71581C8-DC5B-4BAA-A235-D61CE073C796}" type="datetimeFigureOut">
               <a:rPr lang="en-US" smtClean="0"/>
-              <a:t>6/26/2017</a:t>
+              <a:t>7/6/2017</a:t>
             </a:fld>
             <a:endParaRPr lang="en-US"/>
           </a:p>
@@ -2911,7 +2913,7 @@
           <a:p>
             <a:fld id="{C71581C8-DC5B-4BAA-A235-D61CE073C796}" type="datetimeFigureOut">
               <a:rPr lang="en-US" smtClean="0"/>
-              <a:t>6/26/2017</a:t>
+              <a:t>7/6/2017</a:t>
             </a:fld>
             <a:endParaRPr lang="en-US"/>
           </a:p>
@@ -3029,7 +3031,7 @@
           <a:p>
             <a:fld id="{C71581C8-DC5B-4BAA-A235-D61CE073C796}" type="datetimeFigureOut">
               <a:rPr lang="en-US" smtClean="0"/>
-              <a:t>6/26/2017</a:t>
+              <a:t>7/6/2017</a:t>
             </a:fld>
             <a:endParaRPr lang="en-US"/>
           </a:p>
@@ -3124,7 +3126,7 @@
           <a:p>
             <a:fld id="{C71581C8-DC5B-4BAA-A235-D61CE073C796}" type="datetimeFigureOut">
               <a:rPr lang="en-US" smtClean="0"/>
-              <a:t>6/26/2017</a:t>
+              <a:t>7/6/2017</a:t>
             </a:fld>
             <a:endParaRPr lang="en-US"/>
           </a:p>
@@ -3401,7 +3403,7 @@
           <a:p>
             <a:fld id="{C71581C8-DC5B-4BAA-A235-D61CE073C796}" type="datetimeFigureOut">
               <a:rPr lang="en-US" smtClean="0"/>
-              <a:t>6/26/2017</a:t>
+              <a:t>7/6/2017</a:t>
             </a:fld>
             <a:endParaRPr lang="en-US"/>
           </a:p>
@@ -3658,7 +3660,7 @@
           <a:p>
             <a:fld id="{C71581C8-DC5B-4BAA-A235-D61CE073C796}" type="datetimeFigureOut">
               <a:rPr lang="en-US" smtClean="0"/>
-              <a:t>6/26/2017</a:t>
+              <a:t>7/6/2017</a:t>
             </a:fld>
             <a:endParaRPr lang="en-US"/>
           </a:p>
@@ -3871,7 +3873,7 @@
           <a:p>
             <a:fld id="{C71581C8-DC5B-4BAA-A235-D61CE073C796}" type="datetimeFigureOut">
               <a:rPr lang="en-US" smtClean="0"/>
-              <a:t>6/26/2017</a:t>
+              <a:t>7/6/2017</a:t>
             </a:fld>
             <a:endParaRPr lang="en-US"/>
           </a:p>
@@ -5103,13 +5105,13 @@
         </p:spPr>
         <p:txBody>
           <a:bodyPr>
-            <a:normAutofit/>
+            <a:normAutofit fontScale="90000"/>
           </a:bodyPr>
           <a:lstStyle/>
           <a:p>
             <a:r>
               <a:rPr lang="en-US" dirty="0"/>
-              <a:t>Degree (all) </a:t>
+              <a:t>Degree (total) </a:t>
             </a:r>
             <a:r>
               <a:rPr lang="en-US" dirty="0" err="1"/>
@@ -5119,8 +5121,8 @@
           </a:p>
         </p:txBody>
       </p:sp>
-      <mc:AlternateContent xmlns:mc="http://schemas.openxmlformats.org/markup-compatibility/2006" xmlns:a14="http://schemas.microsoft.com/office/drawing/2010/main">
-        <mc:Choice Requires="a14">
+      <mc:AlternateContent xmlns:mc="http://schemas.openxmlformats.org/markup-compatibility/2006">
+        <mc:Choice xmlns:a14="http://schemas.microsoft.com/office/drawing/2010/main" Requires="a14">
           <p:sp>
             <p:nvSpPr>
               <p:cNvPr id="4" name="Text Placeholder 3"/>
@@ -5143,7 +5145,7 @@
               <a:p>
                 <a:r>
                   <a:rPr lang="en-US" dirty="0"/>
-                  <a:t>The degree (all), </a:t>
+                  <a:t>The degree (total), </a:t>
                 </a:r>
                 <a14:m>
                   <m:oMath xmlns:m="http://schemas.openxmlformats.org/officeDocument/2006/math">
@@ -5168,7 +5170,7 @@
                           <a:rPr lang="en-US" b="0" i="1" smtClean="0">
                             <a:latin typeface="Cambria Math" panose="02040503050406030204" pitchFamily="18" charset="0"/>
                           </a:rPr>
-                          <m:t>𝑎𝑙𝑙</m:t>
+                          <m:t>𝑡𝑜𝑡</m:t>
                         </m:r>
                       </m:sub>
                     </m:sSub>
@@ -5201,7 +5203,7 @@
                           <a:rPr lang="en-US" b="0" i="1" smtClean="0">
                             <a:latin typeface="Cambria Math" panose="02040503050406030204" pitchFamily="18" charset="0"/>
                           </a:rPr>
-                          <m:t>𝑎𝑙𝑙</m:t>
+                          <m:t>𝑡𝑜𝑡</m:t>
                         </m:r>
                       </m:sub>
                     </m:sSub>
@@ -5231,7 +5233,7 @@
             </p:txBody>
           </p:sp>
         </mc:Choice>
-        <mc:Fallback xmlns="">
+        <mc:Fallback>
           <p:sp>
             <p:nvSpPr>
               <p:cNvPr id="4" name="Text Placeholder 3"/>
@@ -7275,8 +7277,8 @@
           </a:prstGeom>
         </p:spPr>
       </p:pic>
-      <mc:AlternateContent xmlns:mc="http://schemas.openxmlformats.org/markup-compatibility/2006" xmlns:a14="http://schemas.microsoft.com/office/drawing/2010/main">
-        <mc:Choice Requires="a14">
+      <mc:AlternateContent xmlns:mc="http://schemas.openxmlformats.org/markup-compatibility/2006">
+        <mc:Choice xmlns:a14="http://schemas.microsoft.com/office/drawing/2010/main" Requires="a14">
           <p:sp>
             <p:nvSpPr>
               <p:cNvPr id="7" name="Rectangle 6"/>
@@ -7380,7 +7382,7 @@
             </p:txBody>
           </p:sp>
         </mc:Choice>
-        <mc:Fallback xmlns="">
+        <mc:Fallback>
           <p:sp>
             <p:nvSpPr>
               <p:cNvPr id="7" name="Rectangle 6"/>
@@ -7654,7 +7656,7 @@
 </file>
 
 <file path=ppt/slides/slide19.xml><?xml version="1.0" encoding="utf-8"?>
-<p:sld xmlns:a="http://schemas.openxmlformats.org/drawingml/2006/main" xmlns:r="http://schemas.openxmlformats.org/officeDocument/2006/relationships" xmlns:p="http://schemas.openxmlformats.org/presentationml/2006/main">
+<p:sld xmlns:a="http://schemas.openxmlformats.org/drawingml/2006/main" xmlns:r="http://schemas.openxmlformats.org/officeDocument/2006/relationships" xmlns:p="http://schemas.openxmlformats.org/presentationml/2006/main" show="0">
   <p:cSld>
     <p:spTree>
       <p:nvGrpSpPr>
@@ -8542,6 +8544,113 @@
 </p:sld>
 </file>
 
+<file path=ppt/slides/slide20.xml><?xml version="1.0" encoding="utf-8"?>
+<p:sld xmlns:a="http://schemas.openxmlformats.org/drawingml/2006/main" xmlns:r="http://schemas.openxmlformats.org/officeDocument/2006/relationships" xmlns:p="http://schemas.openxmlformats.org/presentationml/2006/main">
+  <p:cSld>
+    <p:spTree>
+      <p:nvGrpSpPr>
+        <p:cNvPr id="1" name=""/>
+        <p:cNvGrpSpPr/>
+        <p:nvPr/>
+      </p:nvGrpSpPr>
+      <p:grpSpPr>
+        <a:xfrm>
+          <a:off x="0" y="0"/>
+          <a:ext cx="0" cy="0"/>
+          <a:chOff x="0" y="0"/>
+          <a:chExt cx="0" cy="0"/>
+        </a:xfrm>
+      </p:grpSpPr>
+      <p:sp>
+        <p:nvSpPr>
+          <p:cNvPr id="5" name="Title 4"/>
+          <p:cNvSpPr>
+            <a:spLocks noGrp="1"/>
+          </p:cNvSpPr>
+          <p:nvPr>
+            <p:ph type="title"/>
+          </p:nvPr>
+        </p:nvSpPr>
+        <p:spPr/>
+        <p:txBody>
+          <a:bodyPr/>
+          <a:lstStyle/>
+          <a:p>
+            <a:endParaRPr lang="en-US" dirty="0"/>
+          </a:p>
+        </p:txBody>
+      </p:sp>
+      <p:pic>
+        <p:nvPicPr>
+          <p:cNvPr id="19" name="Content Placeholder 18" descr="Screen Clipping"/>
+          <p:cNvPicPr>
+            <a:picLocks noGrp="1" noChangeAspect="1"/>
+          </p:cNvPicPr>
+          <p:nvPr>
+            <p:ph sz="half" idx="2"/>
+          </p:nvPr>
+        </p:nvPicPr>
+        <p:blipFill>
+          <a:blip r:embed="rId2">
+            <a:extLst>
+              <a:ext uri="{28A0092B-C50C-407E-A947-70E740481C1C}">
+                <a14:useLocalDpi xmlns:a14="http://schemas.microsoft.com/office/drawing/2010/main" val="0"/>
+              </a:ext>
+            </a:extLst>
+          </a:blip>
+          <a:stretch>
+            <a:fillRect/>
+          </a:stretch>
+        </p:blipFill>
+        <p:spPr>
+          <a:xfrm>
+            <a:off x="7453129" y="2358002"/>
+            <a:ext cx="2619741" cy="3286584"/>
+          </a:xfrm>
+        </p:spPr>
+      </p:pic>
+      <p:pic>
+        <p:nvPicPr>
+          <p:cNvPr id="18" name="Content Placeholder 17" descr="Screen Clipping"/>
+          <p:cNvPicPr>
+            <a:picLocks noGrp="1" noChangeAspect="1"/>
+          </p:cNvPicPr>
+          <p:nvPr>
+            <p:ph sz="half" idx="1"/>
+          </p:nvPr>
+        </p:nvPicPr>
+        <p:blipFill>
+          <a:blip r:embed="rId3">
+            <a:extLst>
+              <a:ext uri="{28A0092B-C50C-407E-A947-70E740481C1C}">
+                <a14:useLocalDpi xmlns:a14="http://schemas.microsoft.com/office/drawing/2010/main" val="0"/>
+              </a:ext>
+            </a:extLst>
+          </a:blip>
+          <a:stretch>
+            <a:fillRect/>
+          </a:stretch>
+        </p:blipFill>
+        <p:spPr>
+          <a:xfrm>
+            <a:off x="2157235" y="2377055"/>
+            <a:ext cx="2543530" cy="3248478"/>
+          </a:xfrm>
+        </p:spPr>
+      </p:pic>
+    </p:spTree>
+    <p:extLst>
+      <p:ext uri="{BB962C8B-B14F-4D97-AF65-F5344CB8AC3E}">
+        <p14:creationId xmlns:p14="http://schemas.microsoft.com/office/powerpoint/2010/main" val="2795484734"/>
+      </p:ext>
+    </p:extLst>
+  </p:cSld>
+  <p:clrMapOvr>
+    <a:masterClrMapping/>
+  </p:clrMapOvr>
+</p:sld>
+</file>
+
 <file path=ppt/slides/slide3.xml><?xml version="1.0" encoding="utf-8"?>
 <p:sld xmlns:a="http://schemas.openxmlformats.org/drawingml/2006/main" xmlns:r="http://schemas.openxmlformats.org/officeDocument/2006/relationships" xmlns:p="http://schemas.openxmlformats.org/presentationml/2006/main">
   <p:cSld>
@@ -8770,7 +8879,7 @@
         </p:blipFill>
         <p:spPr>
           <a:xfrm>
-            <a:off x="5344025" y="61502"/>
+            <a:off x="5488805" y="41817"/>
             <a:ext cx="6703195" cy="6785068"/>
           </a:xfrm>
           <a:prstGeom prst="rect">
@@ -8800,7 +8909,7 @@
         </p:blipFill>
         <p:spPr>
           <a:xfrm>
-            <a:off x="574478" y="3107234"/>
+            <a:off x="574478" y="3077411"/>
             <a:ext cx="4024259" cy="3750766"/>
           </a:xfrm>
           <a:prstGeom prst="rect">
@@ -8917,7 +9026,7 @@
           <a:p>
             <a:r>
               <a:rPr lang="en-US" dirty="0"/>
-              <a:t>Within the AOP context, weakly connected components highlight AOP networks where at least one key event relationships.</a:t>
+              <a:t>Within the AOP context, weakly connected components highlight AOP networks where at least one key event relationships is shared.</a:t>
             </a:r>
           </a:p>
           <a:p>
@@ -9439,7 +9548,7 @@
             </a:r>
             <a:r>
               <a:rPr lang="en-US" dirty="0"/>
-              <a:t>The last cycle appears to span multiple AOPs but AOP ID is a missing attribute for one of the three KE events.</a:t>
+              <a:t>The last cycle appears to span multiple AOPs but AOP ID is a missing attribute for one of the three KE.</a:t>
             </a:r>
           </a:p>
           <a:p>

</xml_diff>